<commit_message>
maj diapo diagramme synoptique avant
</commit_message>
<xml_diff>
--- a/documentation/Powerpoint projet DMX.pptx
+++ b/documentation/Powerpoint projet DMX.pptx
@@ -7,22 +7,25 @@
   <p:notesMasterIdLst>
     <p:notesMasterId r:id="rId25"/>
   </p:notesMasterIdLst>
+  <p:handoutMasterIdLst>
+    <p:handoutMasterId r:id="rId26"/>
+  </p:handoutMasterIdLst>
   <p:sldIdLst>
     <p:sldId id="256" r:id="rId2"/>
     <p:sldId id="258" r:id="rId3"/>
     <p:sldId id="260" r:id="rId4"/>
     <p:sldId id="261" r:id="rId5"/>
-    <p:sldId id="295" r:id="rId6"/>
-    <p:sldId id="262" r:id="rId7"/>
-    <p:sldId id="296" r:id="rId8"/>
-    <p:sldId id="263" r:id="rId9"/>
-    <p:sldId id="297" r:id="rId10"/>
-    <p:sldId id="298" r:id="rId11"/>
-    <p:sldId id="264" r:id="rId12"/>
-    <p:sldId id="299" r:id="rId13"/>
-    <p:sldId id="265" r:id="rId14"/>
-    <p:sldId id="300" r:id="rId15"/>
-    <p:sldId id="267" r:id="rId16"/>
+    <p:sldId id="300" r:id="rId6"/>
+    <p:sldId id="267" r:id="rId7"/>
+    <p:sldId id="295" r:id="rId8"/>
+    <p:sldId id="262" r:id="rId9"/>
+    <p:sldId id="296" r:id="rId10"/>
+    <p:sldId id="263" r:id="rId11"/>
+    <p:sldId id="297" r:id="rId12"/>
+    <p:sldId id="298" r:id="rId13"/>
+    <p:sldId id="264" r:id="rId14"/>
+    <p:sldId id="299" r:id="rId15"/>
+    <p:sldId id="265" r:id="rId16"/>
     <p:sldId id="301" r:id="rId17"/>
     <p:sldId id="268" r:id="rId18"/>
     <p:sldId id="302" r:id="rId19"/>
@@ -36,29 +39,29 @@
   <p:notesSz cx="6858000" cy="9144000"/>
   <p:embeddedFontLst>
     <p:embeddedFont>
-      <p:font typeface="PT Sans" panose="020B0604020202020204" charset="0"/>
-      <p:regular r:id="rId26"/>
-      <p:bold r:id="rId27"/>
-      <p:italic r:id="rId28"/>
-      <p:boldItalic r:id="rId29"/>
-    </p:embeddedFont>
-    <p:embeddedFont>
       <p:font typeface="Doppio One" panose="020B0604020202020204" charset="0"/>
-      <p:regular r:id="rId30"/>
+      <p:regular r:id="rId27"/>
     </p:embeddedFont>
     <p:embeddedFont>
       <p:font typeface="Encode Sans Condensed" panose="020B0604020202020204" charset="0"/>
-      <p:regular r:id="rId31"/>
-      <p:bold r:id="rId32"/>
+      <p:regular r:id="rId28"/>
+      <p:bold r:id="rId29"/>
+    </p:embeddedFont>
+    <p:embeddedFont>
+      <p:font typeface="PT Sans" panose="020B0604020202020204" charset="0"/>
+      <p:regular r:id="rId30"/>
+      <p:bold r:id="rId31"/>
+      <p:italic r:id="rId32"/>
+      <p:boldItalic r:id="rId33"/>
+    </p:embeddedFont>
+    <p:embeddedFont>
+      <p:font typeface="Bebas Neue" panose="020B0604020202020204" charset="0"/>
+      <p:regular r:id="rId34"/>
     </p:embeddedFont>
     <p:embeddedFont>
       <p:font typeface="Encode Sans" panose="020B0604020202020204" charset="0"/>
-      <p:regular r:id="rId33"/>
-      <p:bold r:id="rId34"/>
-    </p:embeddedFont>
-    <p:embeddedFont>
-      <p:font typeface="Bebas Neue" panose="020B0604020202020204" charset="0"/>
       <p:regular r:id="rId35"/>
+      <p:bold r:id="rId36"/>
     </p:embeddedFont>
   </p:embeddedFontLst>
   <p:defaultTextStyle>
@@ -292,10 +295,187 @@
   </p:defaultTextStyle>
   <p:extLst>
     <p:ext uri="{EFAFB233-063F-42B5-8137-9DF3F51BA10A}">
-      <p15:sldGuideLst xmlns:p15="http://schemas.microsoft.com/office/powerpoint/2012/main"/>
+      <p15:sldGuideLst xmlns:p15="http://schemas.microsoft.com/office/powerpoint/2012/main">
+        <p15:guide id="1" orient="horz" pos="1620" userDrawn="1">
+          <p15:clr>
+            <a:srgbClr val="A4A3A4"/>
+          </p15:clr>
+        </p15:guide>
+        <p15:guide id="2" pos="2880" userDrawn="1">
+          <p15:clr>
+            <a:srgbClr val="A4A3A4"/>
+          </p15:clr>
+        </p15:guide>
+      </p15:sldGuideLst>
     </p:ext>
   </p:extLst>
 </p:presentation>
+</file>
+
+<file path=ppt/handoutMasters/handoutMaster1.xml><?xml version="1.0" encoding="utf-8"?>
+<p:handoutMaster xmlns:a="http://schemas.openxmlformats.org/drawingml/2006/main" xmlns:r="http://schemas.openxmlformats.org/officeDocument/2006/relationships" xmlns:p="http://schemas.openxmlformats.org/presentationml/2006/main">
+  <p:cSld>
+    <p:bg>
+      <p:bgRef idx="1001">
+        <a:schemeClr val="bg1"/>
+      </p:bgRef>
+    </p:bg>
+    <p:spTree>
+      <p:nvGrpSpPr>
+        <p:cNvPr id="1" name=""/>
+        <p:cNvGrpSpPr/>
+        <p:nvPr/>
+      </p:nvGrpSpPr>
+      <p:grpSpPr>
+        <a:xfrm>
+          <a:off x="0" y="0"/>
+          <a:ext cx="0" cy="0"/>
+          <a:chOff x="0" y="0"/>
+          <a:chExt cx="0" cy="0"/>
+        </a:xfrm>
+      </p:grpSpPr>
+      <p:sp>
+        <p:nvSpPr>
+          <p:cNvPr id="2" name="Espace réservé de l'en-tête 1"/>
+          <p:cNvSpPr>
+            <a:spLocks noGrp="1"/>
+          </p:cNvSpPr>
+          <p:nvPr>
+            <p:ph type="hdr" sz="quarter"/>
+          </p:nvPr>
+        </p:nvSpPr>
+        <p:spPr>
+          <a:xfrm>
+            <a:off x="0" y="0"/>
+            <a:ext cx="2971800" cy="458788"/>
+          </a:xfrm>
+          <a:prstGeom prst="rect">
+            <a:avLst/>
+          </a:prstGeom>
+        </p:spPr>
+        <p:txBody>
+          <a:bodyPr vert="horz" lIns="91440" tIns="45720" rIns="91440" bIns="45720" rtlCol="0"/>
+          <a:lstStyle>
+            <a:lvl1pPr algn="l">
+              <a:defRPr sz="1200"/>
+            </a:lvl1pPr>
+          </a:lstStyle>
+          <a:p>
+            <a:endParaRPr lang="fr-FR"/>
+          </a:p>
+        </p:txBody>
+      </p:sp>
+      <p:sp>
+        <p:nvSpPr>
+          <p:cNvPr id="3" name="Espace réservé de la date 2"/>
+          <p:cNvSpPr>
+            <a:spLocks noGrp="1"/>
+          </p:cNvSpPr>
+          <p:nvPr>
+            <p:ph type="dt" sz="quarter" idx="1"/>
+          </p:nvPr>
+        </p:nvSpPr>
+        <p:spPr>
+          <a:xfrm>
+            <a:off x="3884613" y="0"/>
+            <a:ext cx="2971800" cy="458788"/>
+          </a:xfrm>
+          <a:prstGeom prst="rect">
+            <a:avLst/>
+          </a:prstGeom>
+        </p:spPr>
+        <p:txBody>
+          <a:bodyPr vert="horz" lIns="91440" tIns="45720" rIns="91440" bIns="45720" rtlCol="0"/>
+          <a:lstStyle>
+            <a:lvl1pPr algn="r">
+              <a:defRPr sz="1200"/>
+            </a:lvl1pPr>
+          </a:lstStyle>
+          <a:p>
+            <a:fld id="{1DA53271-07A9-4C99-8A81-8EBBC826DC6D}" type="datetimeFigureOut">
+              <a:rPr lang="fr-FR" smtClean="0"/>
+              <a:t>11/03/2024</a:t>
+            </a:fld>
+            <a:endParaRPr lang="fr-FR"/>
+          </a:p>
+        </p:txBody>
+      </p:sp>
+      <p:sp>
+        <p:nvSpPr>
+          <p:cNvPr id="4" name="Espace réservé du pied de page 3"/>
+          <p:cNvSpPr>
+            <a:spLocks noGrp="1"/>
+          </p:cNvSpPr>
+          <p:nvPr>
+            <p:ph type="ftr" sz="quarter" idx="2"/>
+          </p:nvPr>
+        </p:nvSpPr>
+        <p:spPr>
+          <a:xfrm>
+            <a:off x="0" y="8685213"/>
+            <a:ext cx="2971800" cy="458787"/>
+          </a:xfrm>
+          <a:prstGeom prst="rect">
+            <a:avLst/>
+          </a:prstGeom>
+        </p:spPr>
+        <p:txBody>
+          <a:bodyPr vert="horz" lIns="91440" tIns="45720" rIns="91440" bIns="45720" rtlCol="0" anchor="b"/>
+          <a:lstStyle>
+            <a:lvl1pPr algn="l">
+              <a:defRPr sz="1200"/>
+            </a:lvl1pPr>
+          </a:lstStyle>
+          <a:p>
+            <a:endParaRPr lang="fr-FR"/>
+          </a:p>
+        </p:txBody>
+      </p:sp>
+      <p:sp>
+        <p:nvSpPr>
+          <p:cNvPr id="5" name="Espace réservé du numéro de diapositive 4"/>
+          <p:cNvSpPr>
+            <a:spLocks noGrp="1"/>
+          </p:cNvSpPr>
+          <p:nvPr>
+            <p:ph type="sldNum" sz="quarter" idx="3"/>
+          </p:nvPr>
+        </p:nvSpPr>
+        <p:spPr>
+          <a:xfrm>
+            <a:off x="3884613" y="8685213"/>
+            <a:ext cx="2971800" cy="458787"/>
+          </a:xfrm>
+          <a:prstGeom prst="rect">
+            <a:avLst/>
+          </a:prstGeom>
+        </p:spPr>
+        <p:txBody>
+          <a:bodyPr vert="horz" lIns="91440" tIns="45720" rIns="91440" bIns="45720" rtlCol="0" anchor="b"/>
+          <a:lstStyle>
+            <a:lvl1pPr algn="r">
+              <a:defRPr sz="1200"/>
+            </a:lvl1pPr>
+          </a:lstStyle>
+          <a:p>
+            <a:fld id="{A75DD83B-F8DD-4FCB-9EBE-D7E8FD72D186}" type="slidenum">
+              <a:rPr lang="fr-FR" smtClean="0"/>
+              <a:t>‹N°›</a:t>
+            </a:fld>
+            <a:endParaRPr lang="fr-FR"/>
+          </a:p>
+        </p:txBody>
+      </p:sp>
+    </p:spTree>
+    <p:extLst>
+      <p:ext uri="{BB962C8B-B14F-4D97-AF65-F5344CB8AC3E}">
+        <p14:creationId xmlns:p14="http://schemas.microsoft.com/office/powerpoint/2010/main" val="904005693"/>
+      </p:ext>
+    </p:extLst>
+  </p:cSld>
+  <p:clrMap bg1="lt1" tx1="dk1" bg2="lt2" tx2="dk2" accent1="accent1" accent2="accent2" accent3="accent3" accent4="accent4" accent5="accent5" accent6="accent6" hlink="hlink" folHlink="folHlink"/>
+  <p:hf hdr="0" dt="0"/>
+</p:handoutMaster>
 </file>
 
 <file path=ppt/notesMasters/notesMaster1.xml><?xml version="1.0" encoding="utf-8"?>
@@ -507,6 +687,7 @@
     </p:spTree>
   </p:cSld>
   <p:clrMap bg1="lt1" tx1="dk1" bg2="dk2" tx2="lt2" accent1="accent1" accent2="accent2" accent3="accent3" accent4="accent4" accent5="accent5" accent6="accent6" hlink="hlink" folHlink="folHlink"/>
+  <p:hf hdr="0" dt="0"/>
   <p:notesStyle>
     <a:defPPr marR="0" lvl="0" algn="l" rtl="0">
       <a:lnSpc>
@@ -848,7 +1029,7 @@
   <p:cSld>
     <p:spTree>
       <p:nvGrpSpPr>
-        <p:cNvPr id="1" name="Shape 207"/>
+        <p:cNvPr id="1" name="Shape 239"/>
         <p:cNvGrpSpPr/>
         <p:nvPr/>
       </p:nvGrpSpPr>
@@ -862,7 +1043,7 @@
       </p:grpSpPr>
       <p:sp>
         <p:nvSpPr>
-          <p:cNvPr id="208" name="Google Shape;208;g20a5d1115b7_0_18:notes"/>
+          <p:cNvPr id="240" name="Google Shape;240;g20a5d1115b7_0_55:notes"/>
           <p:cNvSpPr>
             <a:spLocks noGrp="1" noRot="1" noChangeAspect="1"/>
           </p:cNvSpPr>
@@ -903,7 +1084,7 @@
       </p:sp>
       <p:sp>
         <p:nvSpPr>
-          <p:cNvPr id="209" name="Google Shape;209;g20a5d1115b7_0_18:notes"/>
+          <p:cNvPr id="241" name="Google Shape;241;g20a5d1115b7_0_55:notes"/>
           <p:cNvSpPr txBox="1">
             <a:spLocks noGrp="1"/>
           </p:cNvSpPr>
@@ -940,11 +1121,6 @@
         </p:txBody>
       </p:sp>
     </p:spTree>
-    <p:extLst>
-      <p:ext uri="{BB962C8B-B14F-4D97-AF65-F5344CB8AC3E}">
-        <p14:creationId xmlns:p14="http://schemas.microsoft.com/office/powerpoint/2010/main" val="1691134573"/>
-      </p:ext>
-    </p:extLst>
   </p:cSld>
   <p:clrMapOvr>
     <a:masterClrMapping/>
@@ -957,7 +1133,7 @@
   <p:cSld>
     <p:spTree>
       <p:nvGrpSpPr>
-        <p:cNvPr id="1" name="Shape 256"/>
+        <p:cNvPr id="1" name="Shape 239"/>
         <p:cNvGrpSpPr/>
         <p:nvPr/>
       </p:nvGrpSpPr>
@@ -971,7 +1147,7 @@
       </p:grpSpPr>
       <p:sp>
         <p:nvSpPr>
-          <p:cNvPr id="257" name="Google Shape;257;g20a5d1115b7_0_147:notes"/>
+          <p:cNvPr id="240" name="Google Shape;240;g20a5d1115b7_0_55:notes"/>
           <p:cNvSpPr>
             <a:spLocks noGrp="1" noRot="1" noChangeAspect="1"/>
           </p:cNvSpPr>
@@ -1012,7 +1188,7 @@
       </p:sp>
       <p:sp>
         <p:nvSpPr>
-          <p:cNvPr id="258" name="Google Shape;258;g20a5d1115b7_0_147:notes"/>
+          <p:cNvPr id="241" name="Google Shape;241;g20a5d1115b7_0_55:notes"/>
           <p:cNvSpPr txBox="1">
             <a:spLocks noGrp="1"/>
           </p:cNvSpPr>
@@ -1049,6 +1225,11 @@
         </p:txBody>
       </p:sp>
     </p:spTree>
+    <p:extLst>
+      <p:ext uri="{BB962C8B-B14F-4D97-AF65-F5344CB8AC3E}">
+        <p14:creationId xmlns:p14="http://schemas.microsoft.com/office/powerpoint/2010/main" val="737458562"/>
+      </p:ext>
+    </p:extLst>
   </p:cSld>
   <p:clrMapOvr>
     <a:masterClrMapping/>
@@ -1155,7 +1336,7 @@
     </p:spTree>
     <p:extLst>
       <p:ext uri="{BB962C8B-B14F-4D97-AF65-F5344CB8AC3E}">
-        <p14:creationId xmlns:p14="http://schemas.microsoft.com/office/powerpoint/2010/main" val="4131811608"/>
+        <p14:creationId xmlns:p14="http://schemas.microsoft.com/office/powerpoint/2010/main" val="1691134573"/>
       </p:ext>
     </p:extLst>
   </p:cSld>
@@ -1170,7 +1351,7 @@
   <p:cSld>
     <p:spTree>
       <p:nvGrpSpPr>
-        <p:cNvPr id="1" name="Shape 279"/>
+        <p:cNvPr id="1" name="Shape 256"/>
         <p:cNvGrpSpPr/>
         <p:nvPr/>
       </p:nvGrpSpPr>
@@ -1184,7 +1365,7 @@
       </p:grpSpPr>
       <p:sp>
         <p:nvSpPr>
-          <p:cNvPr id="280" name="Google Shape;280;g20a5d1115b7_0_177:notes"/>
+          <p:cNvPr id="257" name="Google Shape;257;g20a5d1115b7_0_147:notes"/>
           <p:cNvSpPr>
             <a:spLocks noGrp="1" noRot="1" noChangeAspect="1"/>
           </p:cNvSpPr>
@@ -1225,7 +1406,7 @@
       </p:sp>
       <p:sp>
         <p:nvSpPr>
-          <p:cNvPr id="281" name="Google Shape;281;g20a5d1115b7_0_177:notes"/>
+          <p:cNvPr id="258" name="Google Shape;258;g20a5d1115b7_0_147:notes"/>
           <p:cNvSpPr txBox="1">
             <a:spLocks noGrp="1"/>
           </p:cNvSpPr>
@@ -1368,7 +1549,7 @@
     </p:spTree>
     <p:extLst>
       <p:ext uri="{BB962C8B-B14F-4D97-AF65-F5344CB8AC3E}">
-        <p14:creationId xmlns:p14="http://schemas.microsoft.com/office/powerpoint/2010/main" val="3646692932"/>
+        <p14:creationId xmlns:p14="http://schemas.microsoft.com/office/powerpoint/2010/main" val="4131811608"/>
       </p:ext>
     </p:extLst>
   </p:cSld>
@@ -1383,7 +1564,7 @@
   <p:cSld>
     <p:spTree>
       <p:nvGrpSpPr>
-        <p:cNvPr id="1" name="Shape 297"/>
+        <p:cNvPr id="1" name="Shape 279"/>
         <p:cNvGrpSpPr/>
         <p:nvPr/>
       </p:nvGrpSpPr>
@@ -1397,7 +1578,7 @@
       </p:grpSpPr>
       <p:sp>
         <p:nvSpPr>
-          <p:cNvPr id="298" name="Google Shape;298;g20a5d1115b7_0_209:notes"/>
+          <p:cNvPr id="280" name="Google Shape;280;g20a5d1115b7_0_177:notes"/>
           <p:cNvSpPr>
             <a:spLocks noGrp="1" noRot="1" noChangeAspect="1"/>
           </p:cNvSpPr>
@@ -1438,7 +1619,7 @@
       </p:sp>
       <p:sp>
         <p:nvSpPr>
-          <p:cNvPr id="299" name="Google Shape;299;g20a5d1115b7_0_209:notes"/>
+          <p:cNvPr id="281" name="Google Shape;281;g20a5d1115b7_0_177:notes"/>
           <p:cNvSpPr txBox="1">
             <a:spLocks noGrp="1"/>
           </p:cNvSpPr>
@@ -2755,7 +2936,7 @@
     </p:spTree>
     <p:extLst>
       <p:ext uri="{BB962C8B-B14F-4D97-AF65-F5344CB8AC3E}">
-        <p14:creationId xmlns:p14="http://schemas.microsoft.com/office/powerpoint/2010/main" val="1646228301"/>
+        <p14:creationId xmlns:p14="http://schemas.microsoft.com/office/powerpoint/2010/main" val="3646692932"/>
       </p:ext>
     </p:extLst>
   </p:cSld>
@@ -2770,7 +2951,7 @@
   <p:cSld>
     <p:spTree>
       <p:nvGrpSpPr>
-        <p:cNvPr id="1" name="Shape 225"/>
+        <p:cNvPr id="1" name="Shape 297"/>
         <p:cNvGrpSpPr/>
         <p:nvPr/>
       </p:nvGrpSpPr>
@@ -2784,7 +2965,7 @@
       </p:grpSpPr>
       <p:sp>
         <p:nvSpPr>
-          <p:cNvPr id="226" name="Google Shape;226;g20a5d1115b7_0_41:notes"/>
+          <p:cNvPr id="298" name="Google Shape;298;g20a5d1115b7_0_209:notes"/>
           <p:cNvSpPr>
             <a:spLocks noGrp="1" noRot="1" noChangeAspect="1"/>
           </p:cNvSpPr>
@@ -2825,7 +3006,7 @@
       </p:sp>
       <p:sp>
         <p:nvSpPr>
-          <p:cNvPr id="227" name="Google Shape;227;g20a5d1115b7_0_41:notes"/>
+          <p:cNvPr id="299" name="Google Shape;299;g20a5d1115b7_0_209:notes"/>
           <p:cNvSpPr txBox="1">
             <a:spLocks noGrp="1"/>
           </p:cNvSpPr>
@@ -2968,7 +3149,7 @@
     </p:spTree>
     <p:extLst>
       <p:ext uri="{BB962C8B-B14F-4D97-AF65-F5344CB8AC3E}">
-        <p14:creationId xmlns:p14="http://schemas.microsoft.com/office/powerpoint/2010/main" val="2671376108"/>
+        <p14:creationId xmlns:p14="http://schemas.microsoft.com/office/powerpoint/2010/main" val="1646228301"/>
       </p:ext>
     </p:extLst>
   </p:cSld>
@@ -2983,7 +3164,7 @@
   <p:cSld>
     <p:spTree>
       <p:nvGrpSpPr>
-        <p:cNvPr id="1" name="Shape 239"/>
+        <p:cNvPr id="1" name="Shape 225"/>
         <p:cNvGrpSpPr/>
         <p:nvPr/>
       </p:nvGrpSpPr>
@@ -2997,7 +3178,7 @@
       </p:grpSpPr>
       <p:sp>
         <p:nvSpPr>
-          <p:cNvPr id="240" name="Google Shape;240;g20a5d1115b7_0_55:notes"/>
+          <p:cNvPr id="226" name="Google Shape;226;g20a5d1115b7_0_41:notes"/>
           <p:cNvSpPr>
             <a:spLocks noGrp="1" noRot="1" noChangeAspect="1"/>
           </p:cNvSpPr>
@@ -3038,7 +3219,7 @@
       </p:sp>
       <p:sp>
         <p:nvSpPr>
-          <p:cNvPr id="241" name="Google Shape;241;g20a5d1115b7_0_55:notes"/>
+          <p:cNvPr id="227" name="Google Shape;227;g20a5d1115b7_0_41:notes"/>
           <p:cNvSpPr txBox="1">
             <a:spLocks noGrp="1"/>
           </p:cNvSpPr>
@@ -3087,7 +3268,7 @@
   <p:cSld>
     <p:spTree>
       <p:nvGrpSpPr>
-        <p:cNvPr id="1" name="Shape 239"/>
+        <p:cNvPr id="1" name="Shape 207"/>
         <p:cNvGrpSpPr/>
         <p:nvPr/>
       </p:nvGrpSpPr>
@@ -3101,7 +3282,7 @@
       </p:grpSpPr>
       <p:sp>
         <p:nvSpPr>
-          <p:cNvPr id="240" name="Google Shape;240;g20a5d1115b7_0_55:notes"/>
+          <p:cNvPr id="208" name="Google Shape;208;g20a5d1115b7_0_18:notes"/>
           <p:cNvSpPr>
             <a:spLocks noGrp="1" noRot="1" noChangeAspect="1"/>
           </p:cNvSpPr>
@@ -3142,7 +3323,7 @@
       </p:sp>
       <p:sp>
         <p:nvSpPr>
-          <p:cNvPr id="241" name="Google Shape;241;g20a5d1115b7_0_55:notes"/>
+          <p:cNvPr id="209" name="Google Shape;209;g20a5d1115b7_0_18:notes"/>
           <p:cNvSpPr txBox="1">
             <a:spLocks noGrp="1"/>
           </p:cNvSpPr>
@@ -3181,7 +3362,7 @@
     </p:spTree>
     <p:extLst>
       <p:ext uri="{BB962C8B-B14F-4D97-AF65-F5344CB8AC3E}">
-        <p14:creationId xmlns:p14="http://schemas.microsoft.com/office/powerpoint/2010/main" val="737458562"/>
+        <p14:creationId xmlns:p14="http://schemas.microsoft.com/office/powerpoint/2010/main" val="2671376108"/>
       </p:ext>
     </p:extLst>
   </p:cSld>
@@ -16736,7 +16917,7 @@
     <p:sldLayoutId id="2147483670" r:id="rId17"/>
     <p:sldLayoutId id="2147483671" r:id="rId18"/>
   </p:sldLayoutIdLst>
-  <p:hf sldNum="0" hdr="0" ftr="0" dt="0"/>
+  <p:hf hdr="0" dt="0"/>
   <p:txStyles>
     <p:titleStyle>
       <a:defPPr marR="0" lvl="0" algn="l" rtl="0">
@@ -17565,7 +17746,7 @@
   <p:cSld>
     <p:spTree>
       <p:nvGrpSpPr>
-        <p:cNvPr id="1" name="Shape 210"/>
+        <p:cNvPr id="1" name="Shape 242"/>
         <p:cNvGrpSpPr/>
         <p:nvPr/>
       </p:nvGrpSpPr>
@@ -17579,7 +17760,7 @@
       </p:grpSpPr>
       <p:sp>
         <p:nvSpPr>
-          <p:cNvPr id="211" name="Google Shape;211;p33"/>
+          <p:cNvPr id="248" name="Google Shape;248;p36"/>
           <p:cNvSpPr txBox="1">
             <a:spLocks noGrp="1"/>
           </p:cNvSpPr>
@@ -17589,57 +17770,15 @@
         </p:nvSpPr>
         <p:spPr>
           <a:xfrm>
-            <a:off x="3403454" y="783554"/>
-            <a:ext cx="4383600" cy="1626600"/>
+            <a:off x="5176315" y="1257976"/>
+            <a:ext cx="3112860" cy="572700"/>
           </a:xfrm>
           <a:prstGeom prst="rect">
             <a:avLst/>
           </a:prstGeom>
         </p:spPr>
         <p:txBody>
-          <a:bodyPr spcFirstLastPara="1" wrap="square" lIns="91425" tIns="91425" rIns="91425" bIns="91425" anchor="ctr" anchorCtr="0">
-            <a:noAutofit/>
-          </a:bodyPr>
-          <a:lstStyle/>
-          <a:p>
-            <a:pPr marL="0" lvl="0" indent="0" algn="l" rtl="0">
-              <a:spcBef>
-                <a:spcPts val="0"/>
-              </a:spcBef>
-              <a:spcAft>
-                <a:spcPts val="0"/>
-              </a:spcAft>
-              <a:buNone/>
-            </a:pPr>
-            <a:r>
-              <a:rPr lang="fr-FR" dirty="0"/>
-              <a:t>Diagramme d’exigence</a:t>
-            </a:r>
-            <a:endParaRPr dirty="0"/>
-          </a:p>
-        </p:txBody>
-      </p:sp>
-      <p:sp>
-        <p:nvSpPr>
-          <p:cNvPr id="212" name="Google Shape;212;p33"/>
-          <p:cNvSpPr txBox="1">
-            <a:spLocks noGrp="1"/>
-          </p:cNvSpPr>
-          <p:nvPr>
-            <p:ph type="title" idx="2"/>
-          </p:nvPr>
-        </p:nvSpPr>
-        <p:spPr>
-          <a:xfrm>
-            <a:off x="1356946" y="783550"/>
-            <a:ext cx="2046600" cy="1626600"/>
-          </a:xfrm>
-          <a:prstGeom prst="rect">
-            <a:avLst/>
-          </a:prstGeom>
-        </p:spPr>
-        <p:txBody>
-          <a:bodyPr spcFirstLastPara="1" wrap="square" lIns="91425" tIns="91425" rIns="91425" bIns="91425" anchor="ctr" anchorCtr="0">
+          <a:bodyPr spcFirstLastPara="1" wrap="square" lIns="91425" tIns="91425" rIns="91425" bIns="91425" anchor="t" anchorCtr="0">
             <a:noAutofit/>
           </a:bodyPr>
           <a:lstStyle/>
@@ -17655,7 +17794,7 @@
             </a:pPr>
             <a:r>
               <a:rPr lang="en" dirty="0"/>
-              <a:t>04</a:t>
+              <a:t>Configurer sa “Light Board”</a:t>
             </a:r>
             <a:endParaRPr dirty="0"/>
           </a:p>
@@ -17663,25 +17802,58 @@
       </p:sp>
       <p:pic>
         <p:nvPicPr>
-          <p:cNvPr id="213" name="Google Shape;213;p33"/>
-          <p:cNvPicPr preferRelativeResize="0">
-            <a:picLocks noGrp="1"/>
+          <p:cNvPr id="12" name="Image 11"/>
+          <p:cNvPicPr>
+            <a:picLocks noChangeAspect="1"/>
           </p:cNvPicPr>
-          <p:nvPr>
-            <p:ph type="pic" idx="3"/>
-          </p:nvPr>
+          <p:nvPr/>
         </p:nvPicPr>
-        <p:blipFill rotWithShape="1">
+        <p:blipFill>
           <a:blip r:embed="rId3">
-            <a:alphaModFix/>
+            <a:extLst>
+              <a:ext uri="{28A0092B-C50C-407E-A947-70E740481C1C}">
+                <a14:useLocalDpi xmlns:a14="http://schemas.microsoft.com/office/drawing/2010/main" val="0"/>
+              </a:ext>
+            </a:extLst>
           </a:blip>
-          <a:srcRect t="37146" b="27145"/>
-          <a:stretch/>
+          <a:stretch>
+            <a:fillRect/>
+          </a:stretch>
         </p:blipFill>
         <p:spPr>
           <a:xfrm>
-            <a:off x="0" y="2967301"/>
-            <a:ext cx="9144003" cy="2176199"/>
+            <a:off x="449580" y="363012"/>
+            <a:ext cx="3443996" cy="4376628"/>
+          </a:xfrm>
+          <a:prstGeom prst="rect">
+            <a:avLst/>
+          </a:prstGeom>
+        </p:spPr>
+      </p:pic>
+      <p:pic>
+        <p:nvPicPr>
+          <p:cNvPr id="13" name="Image 12"/>
+          <p:cNvPicPr>
+            <a:picLocks noChangeAspect="1"/>
+          </p:cNvPicPr>
+          <p:nvPr/>
+        </p:nvPicPr>
+        <p:blipFill>
+          <a:blip r:embed="rId4">
+            <a:extLst>
+              <a:ext uri="{28A0092B-C50C-407E-A947-70E740481C1C}">
+                <a14:useLocalDpi xmlns:a14="http://schemas.microsoft.com/office/drawing/2010/main" val="0"/>
+              </a:ext>
+            </a:extLst>
+          </a:blip>
+          <a:stretch>
+            <a:fillRect/>
+          </a:stretch>
+        </p:blipFill>
+        <p:spPr>
+          <a:xfrm>
+            <a:off x="3885956" y="3931921"/>
+            <a:ext cx="2969422" cy="807720"/>
           </a:xfrm>
           <a:prstGeom prst="rect">
             <a:avLst/>
@@ -17689,11 +17861,6 @@
         </p:spPr>
       </p:pic>
     </p:spTree>
-    <p:extLst>
-      <p:ext uri="{BB962C8B-B14F-4D97-AF65-F5344CB8AC3E}">
-        <p14:creationId xmlns:p14="http://schemas.microsoft.com/office/powerpoint/2010/main" val="3670339790"/>
-      </p:ext>
-    </p:extLst>
   </p:cSld>
   <p:clrMapOvr>
     <a:masterClrMapping/>
@@ -17711,17 +17878,9 @@
 <file path=ppt/slides/slide11.xml><?xml version="1.0" encoding="utf-8"?>
 <p:sld xmlns:a="http://schemas.openxmlformats.org/drawingml/2006/main" xmlns:r="http://schemas.openxmlformats.org/officeDocument/2006/relationships" xmlns:p="http://schemas.openxmlformats.org/presentationml/2006/main">
   <p:cSld>
-    <p:bg>
-      <p:bgPr>
-        <a:solidFill>
-          <a:schemeClr val="lt1"/>
-        </a:solidFill>
-        <a:effectLst/>
-      </p:bgPr>
-    </p:bg>
     <p:spTree>
       <p:nvGrpSpPr>
-        <p:cNvPr id="1" name="Shape 259"/>
+        <p:cNvPr id="1" name="Shape 242"/>
         <p:cNvGrpSpPr/>
         <p:nvPr/>
       </p:nvGrpSpPr>
@@ -17735,7 +17894,7 @@
       </p:grpSpPr>
       <p:sp>
         <p:nvSpPr>
-          <p:cNvPr id="260" name="Google Shape;260;p37"/>
+          <p:cNvPr id="248" name="Google Shape;248;p36"/>
           <p:cNvSpPr txBox="1">
             <a:spLocks noGrp="1"/>
           </p:cNvSpPr>
@@ -17745,8 +17904,8 @@
         </p:nvSpPr>
         <p:spPr>
           <a:xfrm>
-            <a:off x="613320" y="475505"/>
-            <a:ext cx="2312760" cy="572700"/>
+            <a:off x="5176315" y="1257976"/>
+            <a:ext cx="3112860" cy="572700"/>
           </a:xfrm>
           <a:prstGeom prst="rect">
             <a:avLst/>
@@ -17769,7 +17928,7 @@
             </a:pPr>
             <a:r>
               <a:rPr lang="en" dirty="0"/>
-              <a:t>Diagramme d’exigence</a:t>
+              <a:t>Activer une scène</a:t>
             </a:r>
             <a:endParaRPr dirty="0"/>
           </a:p>
@@ -17777,13 +17936,13 @@
       </p:sp>
       <p:pic>
         <p:nvPicPr>
-          <p:cNvPr id="14" name="Image 13"/>
+          <p:cNvPr id="2" name="Image 1"/>
           <p:cNvPicPr>
             <a:picLocks noChangeAspect="1"/>
           </p:cNvPicPr>
           <p:nvPr/>
         </p:nvPicPr>
-        <p:blipFill rotWithShape="1">
+        <p:blipFill>
           <a:blip r:embed="rId3">
             <a:extLst>
               <a:ext uri="{28A0092B-C50C-407E-A947-70E740481C1C}">
@@ -17791,13 +17950,14 @@
               </a:ext>
             </a:extLst>
           </a:blip>
-          <a:srcRect r="76629" b="66351"/>
-          <a:stretch/>
+          <a:stretch>
+            <a:fillRect/>
+          </a:stretch>
         </p:blipFill>
         <p:spPr>
           <a:xfrm>
-            <a:off x="3195683" y="695546"/>
-            <a:ext cx="2361397" cy="3754534"/>
+            <a:off x="458687" y="373380"/>
+            <a:ext cx="4046777" cy="4366260"/>
           </a:xfrm>
           <a:prstGeom prst="rect">
             <a:avLst/>
@@ -17806,104 +17966,40 @@
       </p:pic>
       <p:pic>
         <p:nvPicPr>
-          <p:cNvPr id="15" name="Image 14"/>
+          <p:cNvPr id="3" name="Image 2"/>
           <p:cNvPicPr>
             <a:picLocks noChangeAspect="1"/>
           </p:cNvPicPr>
           <p:nvPr/>
         </p:nvPicPr>
-        <p:blipFill rotWithShape="1">
-          <a:blip r:embed="rId3">
+        <p:blipFill>
+          <a:blip r:embed="rId4">
             <a:extLst>
               <a:ext uri="{28A0092B-C50C-407E-A947-70E740481C1C}">
                 <a14:useLocalDpi xmlns:a14="http://schemas.microsoft.com/office/drawing/2010/main" val="0"/>
               </a:ext>
             </a:extLst>
           </a:blip>
-          <a:srcRect t="34250" r="75923" b="34826"/>
-          <a:stretch/>
+          <a:stretch>
+            <a:fillRect/>
+          </a:stretch>
         </p:blipFill>
         <p:spPr>
           <a:xfrm>
-            <a:off x="6159864" y="1276667"/>
-            <a:ext cx="2237376" cy="3173413"/>
+            <a:off x="4497844" y="4033758"/>
+            <a:ext cx="2371763" cy="705882"/>
           </a:xfrm>
           <a:prstGeom prst="rect">
             <a:avLst/>
           </a:prstGeom>
         </p:spPr>
       </p:pic>
-      <p:cxnSp>
-        <p:nvCxnSpPr>
-          <p:cNvPr id="17" name="Connecteur droit 16"/>
-          <p:cNvCxnSpPr/>
-          <p:nvPr/>
-        </p:nvCxnSpPr>
-        <p:spPr>
-          <a:xfrm>
-            <a:off x="5699760" y="601980"/>
-            <a:ext cx="0" cy="3848100"/>
-          </a:xfrm>
-          <a:prstGeom prst="line">
-            <a:avLst/>
-          </a:prstGeom>
-          <a:ln>
-            <a:solidFill>
-              <a:schemeClr val="tx1"/>
-            </a:solidFill>
-          </a:ln>
-        </p:spPr>
-        <p:style>
-          <a:lnRef idx="2">
-            <a:schemeClr val="accent2"/>
-          </a:lnRef>
-          <a:fillRef idx="0">
-            <a:schemeClr val="accent2"/>
-          </a:fillRef>
-          <a:effectRef idx="1">
-            <a:schemeClr val="accent2"/>
-          </a:effectRef>
-          <a:fontRef idx="minor">
-            <a:schemeClr val="tx1"/>
-          </a:fontRef>
-        </p:style>
-      </p:cxnSp>
-      <p:cxnSp>
-        <p:nvCxnSpPr>
-          <p:cNvPr id="37" name="Connecteur droit 36"/>
-          <p:cNvCxnSpPr/>
-          <p:nvPr/>
-        </p:nvCxnSpPr>
-        <p:spPr>
-          <a:xfrm>
-            <a:off x="5897880" y="601980"/>
-            <a:ext cx="0" cy="3848100"/>
-          </a:xfrm>
-          <a:prstGeom prst="line">
-            <a:avLst/>
-          </a:prstGeom>
-          <a:ln>
-            <a:solidFill>
-              <a:schemeClr val="tx1"/>
-            </a:solidFill>
-          </a:ln>
-        </p:spPr>
-        <p:style>
-          <a:lnRef idx="2">
-            <a:schemeClr val="accent2"/>
-          </a:lnRef>
-          <a:fillRef idx="0">
-            <a:schemeClr val="accent2"/>
-          </a:fillRef>
-          <a:effectRef idx="1">
-            <a:schemeClr val="accent2"/>
-          </a:effectRef>
-          <a:fontRef idx="minor">
-            <a:schemeClr val="tx1"/>
-          </a:fontRef>
-        </p:style>
-      </p:cxnSp>
     </p:spTree>
+    <p:extLst>
+      <p:ext uri="{BB962C8B-B14F-4D97-AF65-F5344CB8AC3E}">
+        <p14:creationId xmlns:p14="http://schemas.microsoft.com/office/powerpoint/2010/main" val="3170045151"/>
+      </p:ext>
+    </p:extLst>
   </p:cSld>
   <p:clrMapOvr>
     <a:masterClrMapping/>
@@ -17971,7 +18067,7 @@
             </a:pPr>
             <a:r>
               <a:rPr lang="fr-FR" dirty="0"/>
-              <a:t>Diagramme de déploiement</a:t>
+              <a:t>Diagramme d’exigence</a:t>
             </a:r>
             <a:endParaRPr dirty="0"/>
           </a:p>
@@ -18012,7 +18108,7 @@
               <a:buNone/>
             </a:pPr>
             <a:r>
-              <a:rPr lang="en" dirty="0"/>
+              <a:rPr lang="en" dirty="0" smtClean="0"/>
               <a:t>05</a:t>
             </a:r>
             <a:endParaRPr dirty="0"/>
@@ -18049,7 +18145,7 @@
     </p:spTree>
     <p:extLst>
       <p:ext uri="{BB962C8B-B14F-4D97-AF65-F5344CB8AC3E}">
-        <p14:creationId xmlns:p14="http://schemas.microsoft.com/office/powerpoint/2010/main" val="543729968"/>
+        <p14:creationId xmlns:p14="http://schemas.microsoft.com/office/powerpoint/2010/main" val="3670339790"/>
       </p:ext>
     </p:extLst>
   </p:cSld>
@@ -18069,9 +18165,17 @@
 <file path=ppt/slides/slide13.xml><?xml version="1.0" encoding="utf-8"?>
 <p:sld xmlns:a="http://schemas.openxmlformats.org/drawingml/2006/main" xmlns:r="http://schemas.openxmlformats.org/officeDocument/2006/relationships" xmlns:p="http://schemas.openxmlformats.org/presentationml/2006/main">
   <p:cSld>
+    <p:bg>
+      <p:bgPr>
+        <a:solidFill>
+          <a:schemeClr val="lt1"/>
+        </a:solidFill>
+        <a:effectLst/>
+      </p:bgPr>
+    </p:bg>
     <p:spTree>
       <p:nvGrpSpPr>
-        <p:cNvPr id="1" name="Shape 282"/>
+        <p:cNvPr id="1" name="Shape 259"/>
         <p:cNvGrpSpPr/>
         <p:nvPr/>
       </p:nvGrpSpPr>
@@ -18083,62 +18187,176 @@
           <a:chExt cx="0" cy="0"/>
         </a:xfrm>
       </p:grpSpPr>
+      <p:sp>
+        <p:nvSpPr>
+          <p:cNvPr id="260" name="Google Shape;260;p37"/>
+          <p:cNvSpPr txBox="1">
+            <a:spLocks noGrp="1"/>
+          </p:cNvSpPr>
+          <p:nvPr>
+            <p:ph type="title"/>
+          </p:nvPr>
+        </p:nvSpPr>
+        <p:spPr>
+          <a:xfrm>
+            <a:off x="613320" y="475505"/>
+            <a:ext cx="2312760" cy="572700"/>
+          </a:xfrm>
+          <a:prstGeom prst="rect">
+            <a:avLst/>
+          </a:prstGeom>
+        </p:spPr>
+        <p:txBody>
+          <a:bodyPr spcFirstLastPara="1" wrap="square" lIns="91425" tIns="91425" rIns="91425" bIns="91425" anchor="t" anchorCtr="0">
+            <a:noAutofit/>
+          </a:bodyPr>
+          <a:lstStyle/>
+          <a:p>
+            <a:pPr marL="0" lvl="0" indent="0" algn="ctr" rtl="0">
+              <a:spcBef>
+                <a:spcPts val="0"/>
+              </a:spcBef>
+              <a:spcAft>
+                <a:spcPts val="0"/>
+              </a:spcAft>
+              <a:buNone/>
+            </a:pPr>
+            <a:r>
+              <a:rPr lang="en" dirty="0"/>
+              <a:t>Diagramme d’exigence</a:t>
+            </a:r>
+            <a:endParaRPr dirty="0"/>
+          </a:p>
+        </p:txBody>
+      </p:sp>
       <p:pic>
         <p:nvPicPr>
-          <p:cNvPr id="289" name="Google Shape;289;p38"/>
-          <p:cNvPicPr preferRelativeResize="0">
-            <a:picLocks noGrp="1"/>
-          </p:cNvPicPr>
-          <p:nvPr>
-            <p:ph type="pic" idx="6"/>
-          </p:nvPr>
-        </p:nvPicPr>
-        <p:blipFill rotWithShape="1">
-          <a:blip r:embed="rId3">
-            <a:alphaModFix/>
-          </a:blip>
-          <a:srcRect l="1475" r="1475"/>
-          <a:stretch/>
-        </p:blipFill>
-        <p:spPr>
-          <a:xfrm>
-            <a:off x="5715000" y="-2250"/>
-            <a:ext cx="3429002" cy="5148000"/>
-          </a:xfrm>
-          <a:prstGeom prst="rect">
-            <a:avLst/>
-          </a:prstGeom>
-        </p:spPr>
-      </p:pic>
-      <p:pic>
-        <p:nvPicPr>
-          <p:cNvPr id="8" name="Image 7"/>
+          <p:cNvPr id="14" name="Image 13"/>
           <p:cNvPicPr>
             <a:picLocks noChangeAspect="1"/>
           </p:cNvPicPr>
           <p:nvPr/>
         </p:nvPicPr>
         <p:blipFill rotWithShape="1">
-          <a:blip r:embed="rId4">
+          <a:blip r:embed="rId3">
             <a:extLst>
               <a:ext uri="{28A0092B-C50C-407E-A947-70E740481C1C}">
                 <a14:useLocalDpi xmlns:a14="http://schemas.microsoft.com/office/drawing/2010/main" val="0"/>
               </a:ext>
             </a:extLst>
           </a:blip>
-          <a:srcRect l="1070" t="1199" r="740" b="1478"/>
+          <a:srcRect r="76629" b="66351"/>
           <a:stretch/>
         </p:blipFill>
         <p:spPr>
           <a:xfrm>
-            <a:off x="437606" y="352698"/>
-            <a:ext cx="4918165" cy="4415246"/>
+            <a:off x="3195683" y="695546"/>
+            <a:ext cx="2361397" cy="3754534"/>
           </a:xfrm>
           <a:prstGeom prst="rect">
             <a:avLst/>
           </a:prstGeom>
         </p:spPr>
       </p:pic>
+      <p:pic>
+        <p:nvPicPr>
+          <p:cNvPr id="15" name="Image 14"/>
+          <p:cNvPicPr>
+            <a:picLocks noChangeAspect="1"/>
+          </p:cNvPicPr>
+          <p:nvPr/>
+        </p:nvPicPr>
+        <p:blipFill rotWithShape="1">
+          <a:blip r:embed="rId3">
+            <a:extLst>
+              <a:ext uri="{28A0092B-C50C-407E-A947-70E740481C1C}">
+                <a14:useLocalDpi xmlns:a14="http://schemas.microsoft.com/office/drawing/2010/main" val="0"/>
+              </a:ext>
+            </a:extLst>
+          </a:blip>
+          <a:srcRect t="34250" r="75923" b="34826"/>
+          <a:stretch/>
+        </p:blipFill>
+        <p:spPr>
+          <a:xfrm>
+            <a:off x="6159864" y="1276667"/>
+            <a:ext cx="2237376" cy="3173413"/>
+          </a:xfrm>
+          <a:prstGeom prst="rect">
+            <a:avLst/>
+          </a:prstGeom>
+        </p:spPr>
+      </p:pic>
+      <p:cxnSp>
+        <p:nvCxnSpPr>
+          <p:cNvPr id="17" name="Connecteur droit 16"/>
+          <p:cNvCxnSpPr/>
+          <p:nvPr/>
+        </p:nvCxnSpPr>
+        <p:spPr>
+          <a:xfrm>
+            <a:off x="5699760" y="601980"/>
+            <a:ext cx="0" cy="3848100"/>
+          </a:xfrm>
+          <a:prstGeom prst="line">
+            <a:avLst/>
+          </a:prstGeom>
+          <a:ln>
+            <a:solidFill>
+              <a:schemeClr val="tx1"/>
+            </a:solidFill>
+          </a:ln>
+        </p:spPr>
+        <p:style>
+          <a:lnRef idx="2">
+            <a:schemeClr val="accent2"/>
+          </a:lnRef>
+          <a:fillRef idx="0">
+            <a:schemeClr val="accent2"/>
+          </a:fillRef>
+          <a:effectRef idx="1">
+            <a:schemeClr val="accent2"/>
+          </a:effectRef>
+          <a:fontRef idx="minor">
+            <a:schemeClr val="tx1"/>
+          </a:fontRef>
+        </p:style>
+      </p:cxnSp>
+      <p:cxnSp>
+        <p:nvCxnSpPr>
+          <p:cNvPr id="37" name="Connecteur droit 36"/>
+          <p:cNvCxnSpPr/>
+          <p:nvPr/>
+        </p:nvCxnSpPr>
+        <p:spPr>
+          <a:xfrm>
+            <a:off x="5897880" y="601980"/>
+            <a:ext cx="0" cy="3848100"/>
+          </a:xfrm>
+          <a:prstGeom prst="line">
+            <a:avLst/>
+          </a:prstGeom>
+          <a:ln>
+            <a:solidFill>
+              <a:schemeClr val="tx1"/>
+            </a:solidFill>
+          </a:ln>
+        </p:spPr>
+        <p:style>
+          <a:lnRef idx="2">
+            <a:schemeClr val="accent2"/>
+          </a:lnRef>
+          <a:fillRef idx="0">
+            <a:schemeClr val="accent2"/>
+          </a:fillRef>
+          <a:effectRef idx="1">
+            <a:schemeClr val="accent2"/>
+          </a:effectRef>
+          <a:fontRef idx="minor">
+            <a:schemeClr val="tx1"/>
+          </a:fontRef>
+        </p:style>
+      </p:cxnSp>
     </p:spTree>
   </p:cSld>
   <p:clrMapOvr>
@@ -18207,7 +18425,7 @@
             </a:pPr>
             <a:r>
               <a:rPr lang="fr-FR" dirty="0"/>
-              <a:t>Diagramme synoptique</a:t>
+              <a:t>Diagramme de déploiement</a:t>
             </a:r>
             <a:endParaRPr dirty="0"/>
           </a:p>
@@ -18248,7 +18466,7 @@
               <a:buNone/>
             </a:pPr>
             <a:r>
-              <a:rPr lang="en" dirty="0"/>
+              <a:rPr lang="en" dirty="0" smtClean="0"/>
               <a:t>06</a:t>
             </a:r>
             <a:endParaRPr dirty="0"/>
@@ -18285,7 +18503,7 @@
     </p:spTree>
     <p:extLst>
       <p:ext uri="{BB962C8B-B14F-4D97-AF65-F5344CB8AC3E}">
-        <p14:creationId xmlns:p14="http://schemas.microsoft.com/office/powerpoint/2010/main" val="816983680"/>
+        <p14:creationId xmlns:p14="http://schemas.microsoft.com/office/powerpoint/2010/main" val="543729968"/>
       </p:ext>
     </p:extLst>
   </p:cSld>
@@ -18307,7 +18525,7 @@
   <p:cSld>
     <p:spTree>
       <p:nvGrpSpPr>
-        <p:cNvPr id="1" name="Shape 300"/>
+        <p:cNvPr id="1" name="Shape 282"/>
         <p:cNvGrpSpPr/>
         <p:nvPr/>
       </p:nvGrpSpPr>
@@ -18319,80 +18537,56 @@
           <a:chExt cx="0" cy="0"/>
         </a:xfrm>
       </p:grpSpPr>
-      <p:sp>
-        <p:nvSpPr>
-          <p:cNvPr id="301" name="Google Shape;301;p40"/>
-          <p:cNvSpPr txBox="1">
-            <a:spLocks noGrp="1"/>
-          </p:cNvSpPr>
-          <p:nvPr>
-            <p:ph type="title"/>
-          </p:nvPr>
-        </p:nvSpPr>
-        <p:spPr>
-          <a:xfrm>
-            <a:off x="5341392" y="535931"/>
-            <a:ext cx="3146606" cy="572700"/>
-          </a:xfrm>
-          <a:prstGeom prst="rect">
-            <a:avLst/>
-          </a:prstGeom>
-        </p:spPr>
-        <p:txBody>
-          <a:bodyPr spcFirstLastPara="1" wrap="square" lIns="91425" tIns="91425" rIns="91425" bIns="91425" anchor="t" anchorCtr="0">
-            <a:noAutofit/>
-          </a:bodyPr>
-          <a:lstStyle/>
-          <a:p>
-            <a:pPr marL="0" lvl="0" indent="0" algn="ctr" rtl="0">
-              <a:spcBef>
-                <a:spcPts val="0"/>
-              </a:spcBef>
-              <a:spcAft>
-                <a:spcPts val="0"/>
-              </a:spcAft>
-              <a:buNone/>
-            </a:pPr>
-            <a:r>
-              <a:rPr lang="en" dirty="0"/>
-              <a:t>D</a:t>
-            </a:r>
-            <a:r>
-              <a:rPr lang="fr-FR" dirty="0"/>
-              <a:t>i</a:t>
-            </a:r>
-            <a:r>
-              <a:rPr lang="en" dirty="0"/>
-              <a:t>agramme synoptique</a:t>
-            </a:r>
-            <a:endParaRPr dirty="0"/>
-          </a:p>
-        </p:txBody>
-      </p:sp>
       <p:pic>
         <p:nvPicPr>
-          <p:cNvPr id="2" name="Image 1"/>
+          <p:cNvPr id="289" name="Google Shape;289;p38"/>
+          <p:cNvPicPr preferRelativeResize="0">
+            <a:picLocks noGrp="1"/>
+          </p:cNvPicPr>
+          <p:nvPr>
+            <p:ph type="pic" idx="6"/>
+          </p:nvPr>
+        </p:nvPicPr>
+        <p:blipFill rotWithShape="1">
+          <a:blip r:embed="rId3">
+            <a:alphaModFix/>
+          </a:blip>
+          <a:srcRect l="1475" r="1475"/>
+          <a:stretch/>
+        </p:blipFill>
+        <p:spPr>
+          <a:xfrm>
+            <a:off x="5715000" y="-2250"/>
+            <a:ext cx="3429002" cy="5148000"/>
+          </a:xfrm>
+          <a:prstGeom prst="rect">
+            <a:avLst/>
+          </a:prstGeom>
+        </p:spPr>
+      </p:pic>
+      <p:pic>
+        <p:nvPicPr>
+          <p:cNvPr id="8" name="Image 7"/>
           <p:cNvPicPr>
             <a:picLocks noChangeAspect="1"/>
           </p:cNvPicPr>
           <p:nvPr/>
         </p:nvPicPr>
-        <p:blipFill>
-          <a:blip r:embed="rId3">
+        <p:blipFill rotWithShape="1">
+          <a:blip r:embed="rId4">
             <a:extLst>
               <a:ext uri="{28A0092B-C50C-407E-A947-70E740481C1C}">
                 <a14:useLocalDpi xmlns:a14="http://schemas.microsoft.com/office/drawing/2010/main" val="0"/>
               </a:ext>
             </a:extLst>
           </a:blip>
-          <a:stretch>
-            <a:fillRect/>
-          </a:stretch>
+          <a:srcRect l="1070" t="1199" r="740" b="1478"/>
+          <a:stretch/>
         </p:blipFill>
         <p:spPr>
           <a:xfrm>
-            <a:off x="1033509" y="1324168"/>
-            <a:ext cx="4367983" cy="3115295"/>
+            <a:off x="437606" y="352698"/>
+            <a:ext cx="4918165" cy="4415246"/>
           </a:xfrm>
           <a:prstGeom prst="rect">
             <a:avLst/>
@@ -19084,7 +19278,7 @@
         </p:nvSpPr>
         <p:spPr>
           <a:xfrm>
-            <a:off x="2758517" y="1593160"/>
+            <a:off x="2694542" y="1593160"/>
             <a:ext cx="1759246" cy="553692"/>
           </a:xfrm>
           <a:prstGeom prst="rect">
@@ -19097,20 +19291,12 @@
           </a:bodyPr>
           <a:lstStyle/>
           <a:p>
-            <a:pPr marL="0" lvl="0" indent="0" algn="ctr" rtl="0">
-              <a:spcBef>
-                <a:spcPts val="0"/>
-              </a:spcBef>
-              <a:spcAft>
-                <a:spcPts val="0"/>
-              </a:spcAft>
-              <a:buNone/>
-            </a:pPr>
+            <a:pPr marL="0" lvl="0" indent="0"/>
             <a:r>
               <a:rPr lang="fr-FR" sz="1400" dirty="0"/>
-              <a:t>Use case</a:t>
+              <a:t>Diagramme synoptique</a:t>
             </a:r>
-            <a:endParaRPr sz="1400" dirty="0"/>
+            <a:endParaRPr lang="fr-FR" sz="1400" dirty="0"/>
           </a:p>
         </p:txBody>
       </p:sp>
@@ -19210,7 +19396,7 @@
         </p:nvSpPr>
         <p:spPr>
           <a:xfrm>
-            <a:off x="4641504" y="1593160"/>
+            <a:off x="6550197" y="1596862"/>
             <a:ext cx="1759246" cy="553692"/>
           </a:xfrm>
           <a:prstGeom prst="rect">
@@ -19252,7 +19438,7 @@
         </p:nvSpPr>
         <p:spPr>
           <a:xfrm>
-            <a:off x="6524491" y="1593160"/>
+            <a:off x="940181" y="2776392"/>
             <a:ext cx="1759246" cy="553692"/>
           </a:xfrm>
           <a:prstGeom prst="rect">
@@ -19378,7 +19564,7 @@
         </p:nvSpPr>
         <p:spPr>
           <a:xfrm>
-            <a:off x="822001" y="2725346"/>
+            <a:off x="2734533" y="2746563"/>
             <a:ext cx="1877426" cy="596127"/>
           </a:xfrm>
           <a:prstGeom prst="rect">
@@ -19412,7 +19598,7 @@
         </p:nvSpPr>
         <p:spPr>
           <a:xfrm>
-            <a:off x="2758517" y="2767781"/>
+            <a:off x="4622369" y="1593160"/>
             <a:ext cx="1759246" cy="553692"/>
           </a:xfrm>
           <a:prstGeom prst="rect">
@@ -19435,10 +19621,9 @@
               <a:buNone/>
             </a:pPr>
             <a:r>
-              <a:rPr lang="fr-FR" sz="1400" dirty="0"/>
-              <a:t>Diagramme synoptique</a:t>
+              <a:rPr lang="fr-FR" sz="1400" dirty="0" smtClean="0"/>
+              <a:t>Use Case</a:t>
             </a:r>
-            <a:endParaRPr sz="1400" dirty="0"/>
           </a:p>
         </p:txBody>
       </p:sp>
@@ -19538,7 +19723,7 @@
         </p:nvSpPr>
         <p:spPr>
           <a:xfrm>
-            <a:off x="4641504" y="2767781"/>
+            <a:off x="4641504" y="2776927"/>
             <a:ext cx="1759246" cy="553692"/>
           </a:xfrm>
           <a:prstGeom prst="rect">
@@ -19580,7 +19765,7 @@
         </p:nvSpPr>
         <p:spPr>
           <a:xfrm>
-            <a:off x="6524491" y="2767781"/>
+            <a:off x="6524491" y="2746563"/>
             <a:ext cx="1759246" cy="553692"/>
           </a:xfrm>
           <a:prstGeom prst="rect">
@@ -19740,7 +19925,7 @@
         </p:nvSpPr>
         <p:spPr>
           <a:xfrm>
-            <a:off x="2640337" y="3899967"/>
+            <a:off x="2694574" y="3898959"/>
             <a:ext cx="1877426" cy="596127"/>
           </a:xfrm>
           <a:prstGeom prst="rect">
@@ -20722,7 +20907,7 @@
             </a:pPr>
             <a:r>
               <a:rPr lang="fr-FR" dirty="0"/>
-              <a:t>Présentation du Use Case</a:t>
+              <a:t>Diagramme synoptique</a:t>
             </a:r>
             <a:endParaRPr dirty="0"/>
           </a:p>
@@ -20763,7 +20948,7 @@
               <a:buNone/>
             </a:pPr>
             <a:r>
-              <a:rPr lang="en" dirty="0"/>
+              <a:rPr lang="en" dirty="0" smtClean="0"/>
               <a:t>02</a:t>
             </a:r>
             <a:endParaRPr dirty="0"/>
@@ -20789,7 +20974,7 @@
         </p:blipFill>
         <p:spPr>
           <a:xfrm>
-            <a:off x="5" y="2967300"/>
+            <a:off x="0" y="2967301"/>
             <a:ext cx="9144003" cy="2176199"/>
           </a:xfrm>
           <a:prstGeom prst="rect">
@@ -20800,7 +20985,7 @@
     </p:spTree>
     <p:extLst>
       <p:ext uri="{BB962C8B-B14F-4D97-AF65-F5344CB8AC3E}">
-        <p14:creationId xmlns:p14="http://schemas.microsoft.com/office/powerpoint/2010/main" val="111857471"/>
+        <p14:creationId xmlns:p14="http://schemas.microsoft.com/office/powerpoint/2010/main" val="816983680"/>
       </p:ext>
     </p:extLst>
   </p:cSld>
@@ -20822,7 +21007,7 @@
   <p:cSld>
     <p:spTree>
       <p:nvGrpSpPr>
-        <p:cNvPr id="1" name="Shape 228"/>
+        <p:cNvPr id="1" name="Shape 300"/>
         <p:cNvGrpSpPr/>
         <p:nvPr/>
       </p:nvGrpSpPr>
@@ -20836,7 +21021,7 @@
       </p:grpSpPr>
       <p:sp>
         <p:nvSpPr>
-          <p:cNvPr id="231" name="Google Shape;231;p35"/>
+          <p:cNvPr id="301" name="Google Shape;301;p40"/>
           <p:cNvSpPr txBox="1">
             <a:spLocks noGrp="1"/>
           </p:cNvSpPr>
@@ -20846,8 +21031,8 @@
         </p:nvSpPr>
         <p:spPr>
           <a:xfrm>
-            <a:off x="719999" y="756451"/>
-            <a:ext cx="3109879" cy="572700"/>
+            <a:off x="5341392" y="535931"/>
+            <a:ext cx="3146606" cy="572700"/>
           </a:xfrm>
           <a:prstGeom prst="rect">
             <a:avLst/>
@@ -20870,61 +21055,23 @@
             </a:pPr>
             <a:r>
               <a:rPr lang="en" dirty="0"/>
-              <a:t>Use case</a:t>
+              <a:t>D</a:t>
+            </a:r>
+            <a:r>
+              <a:rPr lang="fr-FR" dirty="0"/>
+              <a:t>i</a:t>
+            </a:r>
+            <a:r>
+              <a:rPr lang="en" dirty="0"/>
+              <a:t>agramme synoptique</a:t>
             </a:r>
             <a:endParaRPr dirty="0"/>
           </a:p>
         </p:txBody>
       </p:sp>
-      <p:sp>
-        <p:nvSpPr>
-          <p:cNvPr id="232" name="Google Shape;232;p35"/>
-          <p:cNvSpPr txBox="1">
-            <a:spLocks noGrp="1"/>
-          </p:cNvSpPr>
-          <p:nvPr>
-            <p:ph type="subTitle" idx="1"/>
-          </p:nvPr>
-        </p:nvSpPr>
-        <p:spPr>
-          <a:xfrm>
-            <a:off x="1122188" y="1924450"/>
-            <a:ext cx="2305500" cy="1581900"/>
-          </a:xfrm>
-          <a:prstGeom prst="rect">
-            <a:avLst/>
-          </a:prstGeom>
-        </p:spPr>
-        <p:txBody>
-          <a:bodyPr spcFirstLastPara="1" wrap="square" lIns="91425" tIns="91425" rIns="91425" bIns="91425" anchor="t" anchorCtr="0">
-            <a:noAutofit/>
-          </a:bodyPr>
-          <a:lstStyle/>
-          <a:p>
-            <a:pPr marL="0" lvl="0" indent="0" algn="l" rtl="0">
-              <a:spcBef>
-                <a:spcPts val="0"/>
-              </a:spcBef>
-              <a:spcAft>
-                <a:spcPts val="0"/>
-              </a:spcAft>
-              <a:buNone/>
-            </a:pPr>
-            <a:r>
-              <a:rPr lang="en" dirty="0">
-                <a:latin typeface="+mj-lt"/>
-              </a:rPr>
-              <a:t>Ici, dans ce Use Case, je suis me charge de pouvoir configurer sa “light board” et de pouvoir activer une scène.</a:t>
-            </a:r>
-            <a:endParaRPr dirty="0">
-              <a:latin typeface="+mj-lt"/>
-            </a:endParaRPr>
-          </a:p>
-        </p:txBody>
-      </p:sp>
       <p:pic>
         <p:nvPicPr>
-          <p:cNvPr id="10" name="Image 9"/>
+          <p:cNvPr id="2" name="Image 1"/>
           <p:cNvPicPr>
             <a:picLocks noChangeAspect="1"/>
           </p:cNvPicPr>
@@ -20944,8 +21091,8 @@
         </p:blipFill>
         <p:spPr>
           <a:xfrm>
-            <a:off x="4524598" y="381000"/>
-            <a:ext cx="4162064" cy="4383157"/>
+            <a:off x="1033509" y="1324168"/>
+            <a:ext cx="4367983" cy="3115295"/>
           </a:xfrm>
           <a:prstGeom prst="rect">
             <a:avLst/>
@@ -21020,7 +21167,7 @@
             </a:pPr>
             <a:r>
               <a:rPr lang="fr-FR" dirty="0"/>
-              <a:t>Scénario de cas d’utilisations</a:t>
+              <a:t>Présentation du Use Case</a:t>
             </a:r>
             <a:endParaRPr dirty="0"/>
           </a:p>
@@ -21061,7 +21208,7 @@
               <a:buNone/>
             </a:pPr>
             <a:r>
-              <a:rPr lang="en" dirty="0"/>
+              <a:rPr lang="en" dirty="0" smtClean="0"/>
               <a:t>03</a:t>
             </a:r>
             <a:endParaRPr dirty="0"/>
@@ -21098,7 +21245,7 @@
     </p:spTree>
     <p:extLst>
       <p:ext uri="{BB962C8B-B14F-4D97-AF65-F5344CB8AC3E}">
-        <p14:creationId xmlns:p14="http://schemas.microsoft.com/office/powerpoint/2010/main" val="2378676886"/>
+        <p14:creationId xmlns:p14="http://schemas.microsoft.com/office/powerpoint/2010/main" val="111857471"/>
       </p:ext>
     </p:extLst>
   </p:cSld>
@@ -21120,7 +21267,7 @@
   <p:cSld>
     <p:spTree>
       <p:nvGrpSpPr>
-        <p:cNvPr id="1" name="Shape 242"/>
+        <p:cNvPr id="1" name="Shape 228"/>
         <p:cNvGrpSpPr/>
         <p:nvPr/>
       </p:nvGrpSpPr>
@@ -21134,7 +21281,7 @@
       </p:grpSpPr>
       <p:sp>
         <p:nvSpPr>
-          <p:cNvPr id="248" name="Google Shape;248;p36"/>
+          <p:cNvPr id="231" name="Google Shape;231;p35"/>
           <p:cNvSpPr txBox="1">
             <a:spLocks noGrp="1"/>
           </p:cNvSpPr>
@@ -21144,8 +21291,8 @@
         </p:nvSpPr>
         <p:spPr>
           <a:xfrm>
-            <a:off x="5176315" y="1257976"/>
-            <a:ext cx="3112860" cy="572700"/>
+            <a:off x="719999" y="756451"/>
+            <a:ext cx="3109879" cy="572700"/>
           </a:xfrm>
           <a:prstGeom prst="rect">
             <a:avLst/>
@@ -21168,15 +21315,61 @@
             </a:pPr>
             <a:r>
               <a:rPr lang="en" dirty="0"/>
-              <a:t>Configurer sa “Light Board”</a:t>
+              <a:t>Use case</a:t>
             </a:r>
             <a:endParaRPr dirty="0"/>
           </a:p>
         </p:txBody>
       </p:sp>
+      <p:sp>
+        <p:nvSpPr>
+          <p:cNvPr id="232" name="Google Shape;232;p35"/>
+          <p:cNvSpPr txBox="1">
+            <a:spLocks noGrp="1"/>
+          </p:cNvSpPr>
+          <p:nvPr>
+            <p:ph type="subTitle" idx="1"/>
+          </p:nvPr>
+        </p:nvSpPr>
+        <p:spPr>
+          <a:xfrm>
+            <a:off x="1122188" y="1924450"/>
+            <a:ext cx="2305500" cy="1581900"/>
+          </a:xfrm>
+          <a:prstGeom prst="rect">
+            <a:avLst/>
+          </a:prstGeom>
+        </p:spPr>
+        <p:txBody>
+          <a:bodyPr spcFirstLastPara="1" wrap="square" lIns="91425" tIns="91425" rIns="91425" bIns="91425" anchor="t" anchorCtr="0">
+            <a:noAutofit/>
+          </a:bodyPr>
+          <a:lstStyle/>
+          <a:p>
+            <a:pPr marL="0" lvl="0" indent="0" algn="l" rtl="0">
+              <a:spcBef>
+                <a:spcPts val="0"/>
+              </a:spcBef>
+              <a:spcAft>
+                <a:spcPts val="0"/>
+              </a:spcAft>
+              <a:buNone/>
+            </a:pPr>
+            <a:r>
+              <a:rPr lang="en" dirty="0">
+                <a:latin typeface="+mj-lt"/>
+              </a:rPr>
+              <a:t>Ici, dans ce Use Case, je suis me charge de pouvoir configurer sa “light board” et de pouvoir activer une scène.</a:t>
+            </a:r>
+            <a:endParaRPr dirty="0">
+              <a:latin typeface="+mj-lt"/>
+            </a:endParaRPr>
+          </a:p>
+        </p:txBody>
+      </p:sp>
       <p:pic>
         <p:nvPicPr>
-          <p:cNvPr id="12" name="Image 11"/>
+          <p:cNvPr id="10" name="Image 9"/>
           <p:cNvPicPr>
             <a:picLocks noChangeAspect="1"/>
           </p:cNvPicPr>
@@ -21196,38 +21389,8 @@
         </p:blipFill>
         <p:spPr>
           <a:xfrm>
-            <a:off x="449580" y="363012"/>
-            <a:ext cx="3443996" cy="4376628"/>
-          </a:xfrm>
-          <a:prstGeom prst="rect">
-            <a:avLst/>
-          </a:prstGeom>
-        </p:spPr>
-      </p:pic>
-      <p:pic>
-        <p:nvPicPr>
-          <p:cNvPr id="13" name="Image 12"/>
-          <p:cNvPicPr>
-            <a:picLocks noChangeAspect="1"/>
-          </p:cNvPicPr>
-          <p:nvPr/>
-        </p:nvPicPr>
-        <p:blipFill>
-          <a:blip r:embed="rId4">
-            <a:extLst>
-              <a:ext uri="{28A0092B-C50C-407E-A947-70E740481C1C}">
-                <a14:useLocalDpi xmlns:a14="http://schemas.microsoft.com/office/drawing/2010/main" val="0"/>
-              </a:ext>
-            </a:extLst>
-          </a:blip>
-          <a:stretch>
-            <a:fillRect/>
-          </a:stretch>
-        </p:blipFill>
-        <p:spPr>
-          <a:xfrm>
-            <a:off x="3885956" y="3931921"/>
-            <a:ext cx="2969422" cy="807720"/>
+            <a:off x="4524598" y="381000"/>
+            <a:ext cx="4162064" cy="4383157"/>
           </a:xfrm>
           <a:prstGeom prst="rect">
             <a:avLst/>
@@ -21254,7 +21417,7 @@
   <p:cSld>
     <p:spTree>
       <p:nvGrpSpPr>
-        <p:cNvPr id="1" name="Shape 242"/>
+        <p:cNvPr id="1" name="Shape 210"/>
         <p:cNvGrpSpPr/>
         <p:nvPr/>
       </p:nvGrpSpPr>
@@ -21268,7 +21431,7 @@
       </p:grpSpPr>
       <p:sp>
         <p:nvSpPr>
-          <p:cNvPr id="248" name="Google Shape;248;p36"/>
+          <p:cNvPr id="211" name="Google Shape;211;p33"/>
           <p:cNvSpPr txBox="1">
             <a:spLocks noGrp="1"/>
           </p:cNvSpPr>
@@ -21278,15 +21441,57 @@
         </p:nvSpPr>
         <p:spPr>
           <a:xfrm>
-            <a:off x="5176315" y="1257976"/>
-            <a:ext cx="3112860" cy="572700"/>
+            <a:off x="3403454" y="783554"/>
+            <a:ext cx="4383600" cy="1626600"/>
           </a:xfrm>
           <a:prstGeom prst="rect">
             <a:avLst/>
           </a:prstGeom>
         </p:spPr>
         <p:txBody>
-          <a:bodyPr spcFirstLastPara="1" wrap="square" lIns="91425" tIns="91425" rIns="91425" bIns="91425" anchor="t" anchorCtr="0">
+          <a:bodyPr spcFirstLastPara="1" wrap="square" lIns="91425" tIns="91425" rIns="91425" bIns="91425" anchor="ctr" anchorCtr="0">
+            <a:noAutofit/>
+          </a:bodyPr>
+          <a:lstStyle/>
+          <a:p>
+            <a:pPr marL="0" lvl="0" indent="0" algn="l" rtl="0">
+              <a:spcBef>
+                <a:spcPts val="0"/>
+              </a:spcBef>
+              <a:spcAft>
+                <a:spcPts val="0"/>
+              </a:spcAft>
+              <a:buNone/>
+            </a:pPr>
+            <a:r>
+              <a:rPr lang="fr-FR" dirty="0"/>
+              <a:t>Scénario de cas d’utilisations</a:t>
+            </a:r>
+            <a:endParaRPr dirty="0"/>
+          </a:p>
+        </p:txBody>
+      </p:sp>
+      <p:sp>
+        <p:nvSpPr>
+          <p:cNvPr id="212" name="Google Shape;212;p33"/>
+          <p:cNvSpPr txBox="1">
+            <a:spLocks noGrp="1"/>
+          </p:cNvSpPr>
+          <p:nvPr>
+            <p:ph type="title" idx="2"/>
+          </p:nvPr>
+        </p:nvSpPr>
+        <p:spPr>
+          <a:xfrm>
+            <a:off x="1356946" y="783550"/>
+            <a:ext cx="2046600" cy="1626600"/>
+          </a:xfrm>
+          <a:prstGeom prst="rect">
+            <a:avLst/>
+          </a:prstGeom>
+        </p:spPr>
+        <p:txBody>
+          <a:bodyPr spcFirstLastPara="1" wrap="square" lIns="91425" tIns="91425" rIns="91425" bIns="91425" anchor="ctr" anchorCtr="0">
             <a:noAutofit/>
           </a:bodyPr>
           <a:lstStyle/>
@@ -21301,8 +21506,8 @@
               <a:buNone/>
             </a:pPr>
             <a:r>
-              <a:rPr lang="en" dirty="0"/>
-              <a:t>Activer une scène</a:t>
+              <a:rPr lang="en" dirty="0" smtClean="0"/>
+              <a:t>04</a:t>
             </a:r>
             <a:endParaRPr dirty="0"/>
           </a:p>
@@ -21310,58 +21515,25 @@
       </p:sp>
       <p:pic>
         <p:nvPicPr>
-          <p:cNvPr id="2" name="Image 1"/>
-          <p:cNvPicPr>
-            <a:picLocks noChangeAspect="1"/>
+          <p:cNvPr id="213" name="Google Shape;213;p33"/>
+          <p:cNvPicPr preferRelativeResize="0">
+            <a:picLocks noGrp="1"/>
           </p:cNvPicPr>
-          <p:nvPr/>
+          <p:nvPr>
+            <p:ph type="pic" idx="3"/>
+          </p:nvPr>
         </p:nvPicPr>
-        <p:blipFill>
+        <p:blipFill rotWithShape="1">
           <a:blip r:embed="rId3">
-            <a:extLst>
-              <a:ext uri="{28A0092B-C50C-407E-A947-70E740481C1C}">
-                <a14:useLocalDpi xmlns:a14="http://schemas.microsoft.com/office/drawing/2010/main" val="0"/>
-              </a:ext>
-            </a:extLst>
+            <a:alphaModFix/>
           </a:blip>
-          <a:stretch>
-            <a:fillRect/>
-          </a:stretch>
+          <a:srcRect t="37146" b="27145"/>
+          <a:stretch/>
         </p:blipFill>
         <p:spPr>
           <a:xfrm>
-            <a:off x="458687" y="373380"/>
-            <a:ext cx="4046777" cy="4366260"/>
-          </a:xfrm>
-          <a:prstGeom prst="rect">
-            <a:avLst/>
-          </a:prstGeom>
-        </p:spPr>
-      </p:pic>
-      <p:pic>
-        <p:nvPicPr>
-          <p:cNvPr id="3" name="Image 2"/>
-          <p:cNvPicPr>
-            <a:picLocks noChangeAspect="1"/>
-          </p:cNvPicPr>
-          <p:nvPr/>
-        </p:nvPicPr>
-        <p:blipFill>
-          <a:blip r:embed="rId4">
-            <a:extLst>
-              <a:ext uri="{28A0092B-C50C-407E-A947-70E740481C1C}">
-                <a14:useLocalDpi xmlns:a14="http://schemas.microsoft.com/office/drawing/2010/main" val="0"/>
-              </a:ext>
-            </a:extLst>
-          </a:blip>
-          <a:stretch>
-            <a:fillRect/>
-          </a:stretch>
-        </p:blipFill>
-        <p:spPr>
-          <a:xfrm>
-            <a:off x="4497844" y="4033758"/>
-            <a:ext cx="2371763" cy="705882"/>
+            <a:off x="5" y="2967300"/>
+            <a:ext cx="9144003" cy="2176199"/>
           </a:xfrm>
           <a:prstGeom prst="rect">
             <a:avLst/>
@@ -21371,7 +21543,7 @@
     </p:spTree>
     <p:extLst>
       <p:ext uri="{BB962C8B-B14F-4D97-AF65-F5344CB8AC3E}">
-        <p14:creationId xmlns:p14="http://schemas.microsoft.com/office/powerpoint/2010/main" val="3170045151"/>
+        <p14:creationId xmlns:p14="http://schemas.microsoft.com/office/powerpoint/2010/main" val="2378676886"/>
       </p:ext>
     </p:extLst>
   </p:cSld>
@@ -21948,4 +22120,265 @@
   <a:objectDefaults/>
   <a:extraClrSchemeLst/>
 </a:theme>
+</file>
+
+<file path=ppt/theme/theme3.xml><?xml version="1.0" encoding="utf-8"?>
+<a:theme xmlns:a="http://schemas.openxmlformats.org/drawingml/2006/main" name="Thème Office">
+  <a:themeElements>
+    <a:clrScheme name="Office">
+      <a:dk1>
+        <a:sysClr val="windowText" lastClr="000000"/>
+      </a:dk1>
+      <a:lt1>
+        <a:sysClr val="window" lastClr="FFFFFF"/>
+      </a:lt1>
+      <a:dk2>
+        <a:srgbClr val="44546A"/>
+      </a:dk2>
+      <a:lt2>
+        <a:srgbClr val="E7E6E6"/>
+      </a:lt2>
+      <a:accent1>
+        <a:srgbClr val="5B9BD5"/>
+      </a:accent1>
+      <a:accent2>
+        <a:srgbClr val="ED7D31"/>
+      </a:accent2>
+      <a:accent3>
+        <a:srgbClr val="A5A5A5"/>
+      </a:accent3>
+      <a:accent4>
+        <a:srgbClr val="FFC000"/>
+      </a:accent4>
+      <a:accent5>
+        <a:srgbClr val="4472C4"/>
+      </a:accent5>
+      <a:accent6>
+        <a:srgbClr val="70AD47"/>
+      </a:accent6>
+      <a:hlink>
+        <a:srgbClr val="0563C1"/>
+      </a:hlink>
+      <a:folHlink>
+        <a:srgbClr val="954F72"/>
+      </a:folHlink>
+    </a:clrScheme>
+    <a:fontScheme name="Office">
+      <a:majorFont>
+        <a:latin typeface="Calibri Light" panose="020F0302020204030204"/>
+        <a:ea typeface=""/>
+        <a:cs typeface=""/>
+        <a:font script="Jpan" typeface="游ゴシック Light"/>
+        <a:font script="Hang" typeface="맑은 고딕"/>
+        <a:font script="Hans" typeface="等线 Light"/>
+        <a:font script="Hant" typeface="新細明體"/>
+        <a:font script="Arab" typeface="Times New Roman"/>
+        <a:font script="Hebr" typeface="Times New Roman"/>
+        <a:font script="Thai" typeface="Angsana New"/>
+        <a:font script="Ethi" typeface="Nyala"/>
+        <a:font script="Beng" typeface="Vrinda"/>
+        <a:font script="Gujr" typeface="Shruti"/>
+        <a:font script="Khmr" typeface="MoolBoran"/>
+        <a:font script="Knda" typeface="Tunga"/>
+        <a:font script="Guru" typeface="Raavi"/>
+        <a:font script="Cans" typeface="Euphemia"/>
+        <a:font script="Cher" typeface="Plantagenet Cherokee"/>
+        <a:font script="Yiii" typeface="Microsoft Yi Baiti"/>
+        <a:font script="Tibt" typeface="Microsoft Himalaya"/>
+        <a:font script="Thaa" typeface="MV Boli"/>
+        <a:font script="Deva" typeface="Mangal"/>
+        <a:font script="Telu" typeface="Gautami"/>
+        <a:font script="Taml" typeface="Latha"/>
+        <a:font script="Syrc" typeface="Estrangelo Edessa"/>
+        <a:font script="Orya" typeface="Kalinga"/>
+        <a:font script="Mlym" typeface="Kartika"/>
+        <a:font script="Laoo" typeface="DokChampa"/>
+        <a:font script="Sinh" typeface="Iskoola Pota"/>
+        <a:font script="Mong" typeface="Mongolian Baiti"/>
+        <a:font script="Viet" typeface="Times New Roman"/>
+        <a:font script="Uigh" typeface="Microsoft Uighur"/>
+        <a:font script="Geor" typeface="Sylfaen"/>
+      </a:majorFont>
+      <a:minorFont>
+        <a:latin typeface="Calibri" panose="020F0502020204030204"/>
+        <a:ea typeface=""/>
+        <a:cs typeface=""/>
+        <a:font script="Jpan" typeface="游ゴシック"/>
+        <a:font script="Hang" typeface="맑은 고딕"/>
+        <a:font script="Hans" typeface="等线"/>
+        <a:font script="Hant" typeface="新細明體"/>
+        <a:font script="Arab" typeface="Arial"/>
+        <a:font script="Hebr" typeface="Arial"/>
+        <a:font script="Thai" typeface="Cordia New"/>
+        <a:font script="Ethi" typeface="Nyala"/>
+        <a:font script="Beng" typeface="Vrinda"/>
+        <a:font script="Gujr" typeface="Shruti"/>
+        <a:font script="Khmr" typeface="DaunPenh"/>
+        <a:font script="Knda" typeface="Tunga"/>
+        <a:font script="Guru" typeface="Raavi"/>
+        <a:font script="Cans" typeface="Euphemia"/>
+        <a:font script="Cher" typeface="Plantagenet Cherokee"/>
+        <a:font script="Yiii" typeface="Microsoft Yi Baiti"/>
+        <a:font script="Tibt" typeface="Microsoft Himalaya"/>
+        <a:font script="Thaa" typeface="MV Boli"/>
+        <a:font script="Deva" typeface="Mangal"/>
+        <a:font script="Telu" typeface="Gautami"/>
+        <a:font script="Taml" typeface="Latha"/>
+        <a:font script="Syrc" typeface="Estrangelo Edessa"/>
+        <a:font script="Orya" typeface="Kalinga"/>
+        <a:font script="Mlym" typeface="Kartika"/>
+        <a:font script="Laoo" typeface="DokChampa"/>
+        <a:font script="Sinh" typeface="Iskoola Pota"/>
+        <a:font script="Mong" typeface="Mongolian Baiti"/>
+        <a:font script="Viet" typeface="Arial"/>
+        <a:font script="Uigh" typeface="Microsoft Uighur"/>
+        <a:font script="Geor" typeface="Sylfaen"/>
+      </a:minorFont>
+    </a:fontScheme>
+    <a:fmtScheme name="Office">
+      <a:fillStyleLst>
+        <a:solidFill>
+          <a:schemeClr val="phClr"/>
+        </a:solidFill>
+        <a:gradFill rotWithShape="1">
+          <a:gsLst>
+            <a:gs pos="0">
+              <a:schemeClr val="phClr">
+                <a:lumMod val="110000"/>
+                <a:satMod val="105000"/>
+                <a:tint val="67000"/>
+              </a:schemeClr>
+            </a:gs>
+            <a:gs pos="50000">
+              <a:schemeClr val="phClr">
+                <a:lumMod val="105000"/>
+                <a:satMod val="103000"/>
+                <a:tint val="73000"/>
+              </a:schemeClr>
+            </a:gs>
+            <a:gs pos="100000">
+              <a:schemeClr val="phClr">
+                <a:lumMod val="105000"/>
+                <a:satMod val="109000"/>
+                <a:tint val="81000"/>
+              </a:schemeClr>
+            </a:gs>
+          </a:gsLst>
+          <a:lin ang="5400000" scaled="0"/>
+        </a:gradFill>
+        <a:gradFill rotWithShape="1">
+          <a:gsLst>
+            <a:gs pos="0">
+              <a:schemeClr val="phClr">
+                <a:satMod val="103000"/>
+                <a:lumMod val="102000"/>
+                <a:tint val="94000"/>
+              </a:schemeClr>
+            </a:gs>
+            <a:gs pos="50000">
+              <a:schemeClr val="phClr">
+                <a:satMod val="110000"/>
+                <a:lumMod val="100000"/>
+                <a:shade val="100000"/>
+              </a:schemeClr>
+            </a:gs>
+            <a:gs pos="100000">
+              <a:schemeClr val="phClr">
+                <a:lumMod val="99000"/>
+                <a:satMod val="120000"/>
+                <a:shade val="78000"/>
+              </a:schemeClr>
+            </a:gs>
+          </a:gsLst>
+          <a:lin ang="5400000" scaled="0"/>
+        </a:gradFill>
+      </a:fillStyleLst>
+      <a:lnStyleLst>
+        <a:ln w="6350" cap="flat" cmpd="sng" algn="ctr">
+          <a:solidFill>
+            <a:schemeClr val="phClr"/>
+          </a:solidFill>
+          <a:prstDash val="solid"/>
+          <a:miter lim="800000"/>
+        </a:ln>
+        <a:ln w="12700" cap="flat" cmpd="sng" algn="ctr">
+          <a:solidFill>
+            <a:schemeClr val="phClr"/>
+          </a:solidFill>
+          <a:prstDash val="solid"/>
+          <a:miter lim="800000"/>
+        </a:ln>
+        <a:ln w="19050" cap="flat" cmpd="sng" algn="ctr">
+          <a:solidFill>
+            <a:schemeClr val="phClr"/>
+          </a:solidFill>
+          <a:prstDash val="solid"/>
+          <a:miter lim="800000"/>
+        </a:ln>
+      </a:lnStyleLst>
+      <a:effectStyleLst>
+        <a:effectStyle>
+          <a:effectLst/>
+        </a:effectStyle>
+        <a:effectStyle>
+          <a:effectLst/>
+        </a:effectStyle>
+        <a:effectStyle>
+          <a:effectLst>
+            <a:outerShdw blurRad="57150" dist="19050" dir="5400000" algn="ctr" rotWithShape="0">
+              <a:srgbClr val="000000">
+                <a:alpha val="63000"/>
+              </a:srgbClr>
+            </a:outerShdw>
+          </a:effectLst>
+        </a:effectStyle>
+      </a:effectStyleLst>
+      <a:bgFillStyleLst>
+        <a:solidFill>
+          <a:schemeClr val="phClr"/>
+        </a:solidFill>
+        <a:solidFill>
+          <a:schemeClr val="phClr">
+            <a:tint val="95000"/>
+            <a:satMod val="170000"/>
+          </a:schemeClr>
+        </a:solidFill>
+        <a:gradFill rotWithShape="1">
+          <a:gsLst>
+            <a:gs pos="0">
+              <a:schemeClr val="phClr">
+                <a:tint val="93000"/>
+                <a:satMod val="150000"/>
+                <a:shade val="98000"/>
+                <a:lumMod val="102000"/>
+              </a:schemeClr>
+            </a:gs>
+            <a:gs pos="50000">
+              <a:schemeClr val="phClr">
+                <a:tint val="98000"/>
+                <a:satMod val="130000"/>
+                <a:shade val="90000"/>
+                <a:lumMod val="103000"/>
+              </a:schemeClr>
+            </a:gs>
+            <a:gs pos="100000">
+              <a:schemeClr val="phClr">
+                <a:shade val="63000"/>
+                <a:satMod val="120000"/>
+              </a:schemeClr>
+            </a:gs>
+          </a:gsLst>
+          <a:lin ang="5400000" scaled="0"/>
+        </a:gradFill>
+      </a:bgFillStyleLst>
+    </a:fmtScheme>
+  </a:themeElements>
+  <a:objectDefaults/>
+  <a:extraClrSchemeLst/>
+  <a:extLst>
+    <a:ext uri="{05A4C25C-085E-4340-85A3-A5531E510DB2}">
+      <thm15:themeFamily xmlns:thm15="http://schemas.microsoft.com/office/thememl/2012/main" name="Office Theme" id="{62F939B6-93AF-4DB8-9C6B-D6C7DFDC589F}" vid="{4A3C46E8-61CC-4603-A589-7422A47A8E4A}"/>
+    </a:ext>
+  </a:extLst>
+</a:theme>
 </file>
</xml_diff>

<commit_message>
maj diapo diagramme séquence + add fichier revue 2
</commit_message>
<xml_diff>
--- a/documentation/Powerpoint projet DMX.pptx
+++ b/documentation/Powerpoint projet DMX.pptx
@@ -5,10 +5,10 @@
     <p:sldMasterId id="2147483674" r:id="rId1"/>
   </p:sldMasterIdLst>
   <p:notesMasterIdLst>
-    <p:notesMasterId r:id="rId25"/>
+    <p:notesMasterId r:id="rId27"/>
   </p:notesMasterIdLst>
   <p:handoutMasterIdLst>
-    <p:handoutMasterId r:id="rId26"/>
+    <p:handoutMasterId r:id="rId28"/>
   </p:handoutMasterIdLst>
   <p:sldIdLst>
     <p:sldId id="256" r:id="rId2"/>
@@ -22,46 +22,48 @@
     <p:sldId id="296" r:id="rId10"/>
     <p:sldId id="263" r:id="rId11"/>
     <p:sldId id="297" r:id="rId12"/>
-    <p:sldId id="298" r:id="rId13"/>
-    <p:sldId id="264" r:id="rId14"/>
-    <p:sldId id="299" r:id="rId15"/>
-    <p:sldId id="265" r:id="rId16"/>
-    <p:sldId id="301" r:id="rId17"/>
-    <p:sldId id="268" r:id="rId18"/>
-    <p:sldId id="302" r:id="rId19"/>
-    <p:sldId id="269" r:id="rId20"/>
-    <p:sldId id="303" r:id="rId21"/>
-    <p:sldId id="304" r:id="rId22"/>
-    <p:sldId id="305" r:id="rId23"/>
-    <p:sldId id="306" r:id="rId24"/>
+    <p:sldId id="307" r:id="rId13"/>
+    <p:sldId id="308" r:id="rId14"/>
+    <p:sldId id="298" r:id="rId15"/>
+    <p:sldId id="264" r:id="rId16"/>
+    <p:sldId id="299" r:id="rId17"/>
+    <p:sldId id="265" r:id="rId18"/>
+    <p:sldId id="301" r:id="rId19"/>
+    <p:sldId id="268" r:id="rId20"/>
+    <p:sldId id="302" r:id="rId21"/>
+    <p:sldId id="269" r:id="rId22"/>
+    <p:sldId id="303" r:id="rId23"/>
+    <p:sldId id="304" r:id="rId24"/>
+    <p:sldId id="305" r:id="rId25"/>
+    <p:sldId id="306" r:id="rId26"/>
   </p:sldIdLst>
   <p:sldSz cx="9144000" cy="5143500" type="screen16x9"/>
   <p:notesSz cx="6858000" cy="9144000"/>
   <p:embeddedFontLst>
     <p:embeddedFont>
+      <p:font typeface="Bebas Neue" panose="020B0604020202020204" charset="0"/>
+      <p:regular r:id="rId29"/>
+    </p:embeddedFont>
+    <p:embeddedFont>
+      <p:font typeface="Encode Sans" panose="020B0604020202020204" charset="0"/>
+      <p:regular r:id="rId30"/>
+      <p:bold r:id="rId31"/>
+    </p:embeddedFont>
+    <p:embeddedFont>
       <p:font typeface="Doppio One" panose="020B0604020202020204" charset="0"/>
-      <p:regular r:id="rId27"/>
+      <p:regular r:id="rId32"/>
     </p:embeddedFont>
     <p:embeddedFont>
       <p:font typeface="Encode Sans Condensed" panose="020B0604020202020204" charset="0"/>
-      <p:regular r:id="rId28"/>
-      <p:bold r:id="rId29"/>
+      <p:regular r:id="rId33"/>
+      <p:bold r:id="rId34"/>
     </p:embeddedFont>
     <p:embeddedFont>
       <p:font typeface="PT Sans" panose="020B0604020202020204" charset="0"/>
-      <p:regular r:id="rId30"/>
-      <p:bold r:id="rId31"/>
-      <p:italic r:id="rId32"/>
-      <p:boldItalic r:id="rId33"/>
-    </p:embeddedFont>
-    <p:embeddedFont>
-      <p:font typeface="Bebas Neue" panose="020B0604020202020204" charset="0"/>
-      <p:regular r:id="rId34"/>
-    </p:embeddedFont>
-    <p:embeddedFont>
-      <p:font typeface="Encode Sans" panose="020B0604020202020204" charset="0"/>
       <p:regular r:id="rId35"/>
       <p:bold r:id="rId36"/>
+      <p:italic r:id="rId37"/>
+      <p:boldItalic r:id="rId38"/>
     </p:embeddedFont>
   </p:embeddedFontLst>
   <p:defaultTextStyle>
@@ -394,7 +396,7 @@
           <a:p>
             <a:fld id="{1DA53271-07A9-4C99-8A81-8EBBC826DC6D}" type="datetimeFigureOut">
               <a:rPr lang="fr-FR" smtClean="0"/>
-              <a:t>11/03/2024</a:t>
+              <a:t>12/03/2024</a:t>
             </a:fld>
             <a:endParaRPr lang="fr-FR"/>
           </a:p>
@@ -1336,7 +1338,7 @@
     </p:spTree>
     <p:extLst>
       <p:ext uri="{BB962C8B-B14F-4D97-AF65-F5344CB8AC3E}">
-        <p14:creationId xmlns:p14="http://schemas.microsoft.com/office/powerpoint/2010/main" val="1691134573"/>
+        <p14:creationId xmlns:p14="http://schemas.microsoft.com/office/powerpoint/2010/main" val="1978843575"/>
       </p:ext>
     </p:extLst>
   </p:cSld>
@@ -1443,6 +1445,11 @@
         </p:txBody>
       </p:sp>
     </p:spTree>
+    <p:extLst>
+      <p:ext uri="{BB962C8B-B14F-4D97-AF65-F5344CB8AC3E}">
+        <p14:creationId xmlns:p14="http://schemas.microsoft.com/office/powerpoint/2010/main" val="250709335"/>
+      </p:ext>
+    </p:extLst>
   </p:cSld>
   <p:clrMapOvr>
     <a:masterClrMapping/>
@@ -1549,7 +1556,7 @@
     </p:spTree>
     <p:extLst>
       <p:ext uri="{BB962C8B-B14F-4D97-AF65-F5344CB8AC3E}">
-        <p14:creationId xmlns:p14="http://schemas.microsoft.com/office/powerpoint/2010/main" val="4131811608"/>
+        <p14:creationId xmlns:p14="http://schemas.microsoft.com/office/powerpoint/2010/main" val="1691134573"/>
       </p:ext>
     </p:extLst>
   </p:cSld>
@@ -1564,7 +1571,7 @@
   <p:cSld>
     <p:spTree>
       <p:nvGrpSpPr>
-        <p:cNvPr id="1" name="Shape 279"/>
+        <p:cNvPr id="1" name="Shape 256"/>
         <p:cNvGrpSpPr/>
         <p:nvPr/>
       </p:nvGrpSpPr>
@@ -1578,7 +1585,7 @@
       </p:grpSpPr>
       <p:sp>
         <p:nvSpPr>
-          <p:cNvPr id="280" name="Google Shape;280;g20a5d1115b7_0_177:notes"/>
+          <p:cNvPr id="257" name="Google Shape;257;g20a5d1115b7_0_147:notes"/>
           <p:cNvSpPr>
             <a:spLocks noGrp="1" noRot="1" noChangeAspect="1"/>
           </p:cNvSpPr>
@@ -1619,7 +1626,7 @@
       </p:sp>
       <p:sp>
         <p:nvSpPr>
-          <p:cNvPr id="281" name="Google Shape;281;g20a5d1115b7_0_177:notes"/>
+          <p:cNvPr id="258" name="Google Shape;258;g20a5d1115b7_0_147:notes"/>
           <p:cNvSpPr txBox="1">
             <a:spLocks noGrp="1"/>
           </p:cNvSpPr>
@@ -1762,7 +1769,7 @@
     </p:spTree>
     <p:extLst>
       <p:ext uri="{BB962C8B-B14F-4D97-AF65-F5344CB8AC3E}">
-        <p14:creationId xmlns:p14="http://schemas.microsoft.com/office/powerpoint/2010/main" val="1215288995"/>
+        <p14:creationId xmlns:p14="http://schemas.microsoft.com/office/powerpoint/2010/main" val="4131811608"/>
       </p:ext>
     </p:extLst>
   </p:cSld>
@@ -1777,7 +1784,7 @@
   <p:cSld>
     <p:spTree>
       <p:nvGrpSpPr>
-        <p:cNvPr id="1" name="Shape 310"/>
+        <p:cNvPr id="1" name="Shape 279"/>
         <p:cNvGrpSpPr/>
         <p:nvPr/>
       </p:nvGrpSpPr>
@@ -1791,7 +1798,7 @@
       </p:grpSpPr>
       <p:sp>
         <p:nvSpPr>
-          <p:cNvPr id="311" name="Google Shape;311;g20a5d1115b7_0_226:notes"/>
+          <p:cNvPr id="280" name="Google Shape;280;g20a5d1115b7_0_177:notes"/>
           <p:cNvSpPr>
             <a:spLocks noGrp="1" noRot="1" noChangeAspect="1"/>
           </p:cNvSpPr>
@@ -1832,7 +1839,7 @@
       </p:sp>
       <p:sp>
         <p:nvSpPr>
-          <p:cNvPr id="312" name="Google Shape;312;g20a5d1115b7_0_226:notes"/>
+          <p:cNvPr id="281" name="Google Shape;281;g20a5d1115b7_0_177:notes"/>
           <p:cNvSpPr txBox="1">
             <a:spLocks noGrp="1"/>
           </p:cNvSpPr>
@@ -1975,7 +1982,7 @@
     </p:spTree>
     <p:extLst>
       <p:ext uri="{BB962C8B-B14F-4D97-AF65-F5344CB8AC3E}">
-        <p14:creationId xmlns:p14="http://schemas.microsoft.com/office/powerpoint/2010/main" val="2490064198"/>
+        <p14:creationId xmlns:p14="http://schemas.microsoft.com/office/powerpoint/2010/main" val="1215288995"/>
       </p:ext>
     </p:extLst>
   </p:cSld>
@@ -1990,7 +1997,7 @@
   <p:cSld>
     <p:spTree>
       <p:nvGrpSpPr>
-        <p:cNvPr id="1" name="Shape 316"/>
+        <p:cNvPr id="1" name="Shape 310"/>
         <p:cNvGrpSpPr/>
         <p:nvPr/>
       </p:nvGrpSpPr>
@@ -2004,7 +2011,7 @@
       </p:grpSpPr>
       <p:sp>
         <p:nvSpPr>
-          <p:cNvPr id="317" name="Google Shape;317;g20a5d1115b7_0_237:notes"/>
+          <p:cNvPr id="311" name="Google Shape;311;g20a5d1115b7_0_226:notes"/>
           <p:cNvSpPr>
             <a:spLocks noGrp="1" noRot="1" noChangeAspect="1"/>
           </p:cNvSpPr>
@@ -2045,7 +2052,7 @@
       </p:sp>
       <p:sp>
         <p:nvSpPr>
-          <p:cNvPr id="318" name="Google Shape;318;g20a5d1115b7_0_237:notes"/>
+          <p:cNvPr id="312" name="Google Shape;312;g20a5d1115b7_0_226:notes"/>
           <p:cNvSpPr txBox="1">
             <a:spLocks noGrp="1"/>
           </p:cNvSpPr>
@@ -2292,7 +2299,7 @@
     </p:spTree>
     <p:extLst>
       <p:ext uri="{BB962C8B-B14F-4D97-AF65-F5344CB8AC3E}">
-        <p14:creationId xmlns:p14="http://schemas.microsoft.com/office/powerpoint/2010/main" val="3014139562"/>
+        <p14:creationId xmlns:p14="http://schemas.microsoft.com/office/powerpoint/2010/main" val="2490064198"/>
       </p:ext>
     </p:extLst>
   </p:cSld>
@@ -2399,11 +2406,6 @@
         </p:txBody>
       </p:sp>
     </p:spTree>
-    <p:extLst>
-      <p:ext uri="{BB962C8B-B14F-4D97-AF65-F5344CB8AC3E}">
-        <p14:creationId xmlns:p14="http://schemas.microsoft.com/office/powerpoint/2010/main" val="4284217892"/>
-      </p:ext>
-    </p:extLst>
   </p:cSld>
   <p:clrMapOvr>
     <a:masterClrMapping/>
@@ -2510,6 +2512,224 @@
     </p:spTree>
     <p:extLst>
       <p:ext uri="{BB962C8B-B14F-4D97-AF65-F5344CB8AC3E}">
+        <p14:creationId xmlns:p14="http://schemas.microsoft.com/office/powerpoint/2010/main" val="3014139562"/>
+      </p:ext>
+    </p:extLst>
+  </p:cSld>
+  <p:clrMapOvr>
+    <a:masterClrMapping/>
+  </p:clrMapOvr>
+</p:notes>
+</file>
+
+<file path=ppt/notesSlides/notesSlide23.xml><?xml version="1.0" encoding="utf-8"?>
+<p:notes xmlns:a="http://schemas.openxmlformats.org/drawingml/2006/main" xmlns:r="http://schemas.openxmlformats.org/officeDocument/2006/relationships" xmlns:p="http://schemas.openxmlformats.org/presentationml/2006/main" showMasterSp="0" showMasterPhAnim="0">
+  <p:cSld>
+    <p:spTree>
+      <p:nvGrpSpPr>
+        <p:cNvPr id="1" name="Shape 316"/>
+        <p:cNvGrpSpPr/>
+        <p:nvPr/>
+      </p:nvGrpSpPr>
+      <p:grpSpPr>
+        <a:xfrm>
+          <a:off x="0" y="0"/>
+          <a:ext cx="0" cy="0"/>
+          <a:chOff x="0" y="0"/>
+          <a:chExt cx="0" cy="0"/>
+        </a:xfrm>
+      </p:grpSpPr>
+      <p:sp>
+        <p:nvSpPr>
+          <p:cNvPr id="317" name="Google Shape;317;g20a5d1115b7_0_237:notes"/>
+          <p:cNvSpPr>
+            <a:spLocks noGrp="1" noRot="1" noChangeAspect="1"/>
+          </p:cNvSpPr>
+          <p:nvPr>
+            <p:ph type="sldImg" idx="2"/>
+          </p:nvPr>
+        </p:nvSpPr>
+        <p:spPr>
+          <a:xfrm>
+            <a:off x="381000" y="685800"/>
+            <a:ext cx="6096000" cy="3429000"/>
+          </a:xfrm>
+          <a:custGeom>
+            <a:avLst/>
+            <a:gdLst/>
+            <a:ahLst/>
+            <a:cxnLst/>
+            <a:rect l="l" t="t" r="r" b="b"/>
+            <a:pathLst>
+              <a:path w="120000" h="120000" extrusionOk="0">
+                <a:moveTo>
+                  <a:pt x="0" y="0"/>
+                </a:moveTo>
+                <a:lnTo>
+                  <a:pt x="120000" y="0"/>
+                </a:lnTo>
+                <a:lnTo>
+                  <a:pt x="120000" y="120000"/>
+                </a:lnTo>
+                <a:lnTo>
+                  <a:pt x="0" y="120000"/>
+                </a:lnTo>
+                <a:close/>
+              </a:path>
+            </a:pathLst>
+          </a:custGeom>
+        </p:spPr>
+      </p:sp>
+      <p:sp>
+        <p:nvSpPr>
+          <p:cNvPr id="318" name="Google Shape;318;g20a5d1115b7_0_237:notes"/>
+          <p:cNvSpPr txBox="1">
+            <a:spLocks noGrp="1"/>
+          </p:cNvSpPr>
+          <p:nvPr>
+            <p:ph type="body" idx="1"/>
+          </p:nvPr>
+        </p:nvSpPr>
+        <p:spPr>
+          <a:xfrm>
+            <a:off x="685800" y="4343400"/>
+            <a:ext cx="5486400" cy="4114800"/>
+          </a:xfrm>
+          <a:prstGeom prst="rect">
+            <a:avLst/>
+          </a:prstGeom>
+        </p:spPr>
+        <p:txBody>
+          <a:bodyPr spcFirstLastPara="1" wrap="square" lIns="91425" tIns="91425" rIns="91425" bIns="91425" anchor="t" anchorCtr="0">
+            <a:noAutofit/>
+          </a:bodyPr>
+          <a:lstStyle/>
+          <a:p>
+            <a:pPr marL="0" lvl="0" indent="0" algn="l" rtl="0">
+              <a:spcBef>
+                <a:spcPts val="0"/>
+              </a:spcBef>
+              <a:spcAft>
+                <a:spcPts val="0"/>
+              </a:spcAft>
+              <a:buNone/>
+            </a:pPr>
+            <a:endParaRPr/>
+          </a:p>
+        </p:txBody>
+      </p:sp>
+    </p:spTree>
+    <p:extLst>
+      <p:ext uri="{BB962C8B-B14F-4D97-AF65-F5344CB8AC3E}">
+        <p14:creationId xmlns:p14="http://schemas.microsoft.com/office/powerpoint/2010/main" val="4284217892"/>
+      </p:ext>
+    </p:extLst>
+  </p:cSld>
+  <p:clrMapOvr>
+    <a:masterClrMapping/>
+  </p:clrMapOvr>
+</p:notes>
+</file>
+
+<file path=ppt/notesSlides/notesSlide24.xml><?xml version="1.0" encoding="utf-8"?>
+<p:notes xmlns:a="http://schemas.openxmlformats.org/drawingml/2006/main" xmlns:r="http://schemas.openxmlformats.org/officeDocument/2006/relationships" xmlns:p="http://schemas.openxmlformats.org/presentationml/2006/main" showMasterSp="0" showMasterPhAnim="0">
+  <p:cSld>
+    <p:spTree>
+      <p:nvGrpSpPr>
+        <p:cNvPr id="1" name="Shape 207"/>
+        <p:cNvGrpSpPr/>
+        <p:nvPr/>
+      </p:nvGrpSpPr>
+      <p:grpSpPr>
+        <a:xfrm>
+          <a:off x="0" y="0"/>
+          <a:ext cx="0" cy="0"/>
+          <a:chOff x="0" y="0"/>
+          <a:chExt cx="0" cy="0"/>
+        </a:xfrm>
+      </p:grpSpPr>
+      <p:sp>
+        <p:nvSpPr>
+          <p:cNvPr id="208" name="Google Shape;208;g20a5d1115b7_0_18:notes"/>
+          <p:cNvSpPr>
+            <a:spLocks noGrp="1" noRot="1" noChangeAspect="1"/>
+          </p:cNvSpPr>
+          <p:nvPr>
+            <p:ph type="sldImg" idx="2"/>
+          </p:nvPr>
+        </p:nvSpPr>
+        <p:spPr>
+          <a:xfrm>
+            <a:off x="381000" y="685800"/>
+            <a:ext cx="6096000" cy="3429000"/>
+          </a:xfrm>
+          <a:custGeom>
+            <a:avLst/>
+            <a:gdLst/>
+            <a:ahLst/>
+            <a:cxnLst/>
+            <a:rect l="l" t="t" r="r" b="b"/>
+            <a:pathLst>
+              <a:path w="120000" h="120000" extrusionOk="0">
+                <a:moveTo>
+                  <a:pt x="0" y="0"/>
+                </a:moveTo>
+                <a:lnTo>
+                  <a:pt x="120000" y="0"/>
+                </a:lnTo>
+                <a:lnTo>
+                  <a:pt x="120000" y="120000"/>
+                </a:lnTo>
+                <a:lnTo>
+                  <a:pt x="0" y="120000"/>
+                </a:lnTo>
+                <a:close/>
+              </a:path>
+            </a:pathLst>
+          </a:custGeom>
+        </p:spPr>
+      </p:sp>
+      <p:sp>
+        <p:nvSpPr>
+          <p:cNvPr id="209" name="Google Shape;209;g20a5d1115b7_0_18:notes"/>
+          <p:cNvSpPr txBox="1">
+            <a:spLocks noGrp="1"/>
+          </p:cNvSpPr>
+          <p:nvPr>
+            <p:ph type="body" idx="1"/>
+          </p:nvPr>
+        </p:nvSpPr>
+        <p:spPr>
+          <a:xfrm>
+            <a:off x="685800" y="4343400"/>
+            <a:ext cx="5486400" cy="4114800"/>
+          </a:xfrm>
+          <a:prstGeom prst="rect">
+            <a:avLst/>
+          </a:prstGeom>
+        </p:spPr>
+        <p:txBody>
+          <a:bodyPr spcFirstLastPara="1" wrap="square" lIns="91425" tIns="91425" rIns="91425" bIns="91425" anchor="t" anchorCtr="0">
+            <a:noAutofit/>
+          </a:bodyPr>
+          <a:lstStyle/>
+          <a:p>
+            <a:pPr marL="0" lvl="0" indent="0" algn="l" rtl="0">
+              <a:spcBef>
+                <a:spcPts val="0"/>
+              </a:spcBef>
+              <a:spcAft>
+                <a:spcPts val="0"/>
+              </a:spcAft>
+              <a:buNone/>
+            </a:pPr>
+            <a:endParaRPr/>
+          </a:p>
+        </p:txBody>
+      </p:sp>
+    </p:spTree>
+    <p:extLst>
+      <p:ext uri="{BB962C8B-B14F-4D97-AF65-F5344CB8AC3E}">
         <p14:creationId xmlns:p14="http://schemas.microsoft.com/office/powerpoint/2010/main" val="362382355"/>
       </p:ext>
     </p:extLst>
@@ -2520,7 +2740,7 @@
 </p:notes>
 </file>
 
-<file path=ppt/notesSlides/notesSlide23.xml><?xml version="1.0" encoding="utf-8"?>
+<file path=ppt/notesSlides/notesSlide25.xml><?xml version="1.0" encoding="utf-8"?>
 <p:notes xmlns:a="http://schemas.openxmlformats.org/drawingml/2006/main" xmlns:r="http://schemas.openxmlformats.org/officeDocument/2006/relationships" xmlns:p="http://schemas.openxmlformats.org/presentationml/2006/main" showMasterSp="0" showMasterPhAnim="0">
   <p:cSld>
     <p:spTree>
@@ -18066,8 +18286,16 @@
               <a:buNone/>
             </a:pPr>
             <a:r>
+              <a:rPr lang="fr-FR" dirty="0" smtClean="0"/>
+              <a:t>Diagramme de s</a:t>
+            </a:r>
+            <a:r>
               <a:rPr lang="fr-FR" dirty="0"/>
-              <a:t>Diagramme d’exigence</a:t>
+              <a:t>é</a:t>
+            </a:r>
+            <a:r>
+              <a:rPr lang="fr-FR" dirty="0" smtClean="0"/>
+              <a:t>quence</a:t>
             </a:r>
             <a:endParaRPr dirty="0"/>
           </a:p>
@@ -18134,7 +18362,7 @@
         </p:blipFill>
         <p:spPr>
           <a:xfrm>
-            <a:off x="0" y="2967301"/>
+            <a:off x="5" y="2967300"/>
             <a:ext cx="9144003" cy="2176199"/>
           </a:xfrm>
           <a:prstGeom prst="rect">
@@ -18145,7 +18373,7 @@
     </p:spTree>
     <p:extLst>
       <p:ext uri="{BB962C8B-B14F-4D97-AF65-F5344CB8AC3E}">
-        <p14:creationId xmlns:p14="http://schemas.microsoft.com/office/powerpoint/2010/main" val="3670339790"/>
+        <p14:creationId xmlns:p14="http://schemas.microsoft.com/office/powerpoint/2010/main" val="4116531565"/>
       </p:ext>
     </p:extLst>
   </p:cSld>
@@ -18165,14 +18393,6 @@
 <file path=ppt/slides/slide13.xml><?xml version="1.0" encoding="utf-8"?>
 <p:sld xmlns:a="http://schemas.openxmlformats.org/drawingml/2006/main" xmlns:r="http://schemas.openxmlformats.org/officeDocument/2006/relationships" xmlns:p="http://schemas.openxmlformats.org/presentationml/2006/main">
   <p:cSld>
-    <p:bg>
-      <p:bgPr>
-        <a:solidFill>
-          <a:schemeClr val="lt1"/>
-        </a:solidFill>
-        <a:effectLst/>
-      </p:bgPr>
-    </p:bg>
     <p:spTree>
       <p:nvGrpSpPr>
         <p:cNvPr id="1" name="Shape 259"/>
@@ -18223,7 +18443,11 @@
             </a:pPr>
             <a:r>
               <a:rPr lang="en" dirty="0"/>
-              <a:t>Diagramme d’exigence</a:t>
+              <a:t>Diagramme </a:t>
+            </a:r>
+            <a:r>
+              <a:rPr lang="en" dirty="0" smtClean="0"/>
+              <a:t>de sécance</a:t>
             </a:r>
             <a:endParaRPr dirty="0"/>
           </a:p>
@@ -18231,13 +18455,13 @@
       </p:sp>
       <p:pic>
         <p:nvPicPr>
-          <p:cNvPr id="14" name="Image 13"/>
+          <p:cNvPr id="2" name="Image 1"/>
           <p:cNvPicPr>
             <a:picLocks noChangeAspect="1"/>
           </p:cNvPicPr>
           <p:nvPr/>
         </p:nvPicPr>
-        <p:blipFill rotWithShape="1">
+        <p:blipFill>
           <a:blip r:embed="rId3">
             <a:extLst>
               <a:ext uri="{28A0092B-C50C-407E-A947-70E740481C1C}">
@@ -18245,119 +18469,26 @@
               </a:ext>
             </a:extLst>
           </a:blip>
-          <a:srcRect r="76629" b="66351"/>
-          <a:stretch/>
+          <a:stretch>
+            <a:fillRect/>
+          </a:stretch>
         </p:blipFill>
         <p:spPr>
           <a:xfrm>
-            <a:off x="3195683" y="695546"/>
-            <a:ext cx="2361397" cy="3754534"/>
+            <a:off x="3729445" y="1153795"/>
+            <a:ext cx="3986076" cy="2877321"/>
           </a:xfrm>
           <a:prstGeom prst="rect">
             <a:avLst/>
           </a:prstGeom>
         </p:spPr>
       </p:pic>
-      <p:pic>
-        <p:nvPicPr>
-          <p:cNvPr id="15" name="Image 14"/>
-          <p:cNvPicPr>
-            <a:picLocks noChangeAspect="1"/>
-          </p:cNvPicPr>
-          <p:nvPr/>
-        </p:nvPicPr>
-        <p:blipFill rotWithShape="1">
-          <a:blip r:embed="rId3">
-            <a:extLst>
-              <a:ext uri="{28A0092B-C50C-407E-A947-70E740481C1C}">
-                <a14:useLocalDpi xmlns:a14="http://schemas.microsoft.com/office/drawing/2010/main" val="0"/>
-              </a:ext>
-            </a:extLst>
-          </a:blip>
-          <a:srcRect t="34250" r="75923" b="34826"/>
-          <a:stretch/>
-        </p:blipFill>
-        <p:spPr>
-          <a:xfrm>
-            <a:off x="6159864" y="1276667"/>
-            <a:ext cx="2237376" cy="3173413"/>
-          </a:xfrm>
-          <a:prstGeom prst="rect">
-            <a:avLst/>
-          </a:prstGeom>
-        </p:spPr>
-      </p:pic>
-      <p:cxnSp>
-        <p:nvCxnSpPr>
-          <p:cNvPr id="17" name="Connecteur droit 16"/>
-          <p:cNvCxnSpPr/>
-          <p:nvPr/>
-        </p:nvCxnSpPr>
-        <p:spPr>
-          <a:xfrm>
-            <a:off x="5699760" y="601980"/>
-            <a:ext cx="0" cy="3848100"/>
-          </a:xfrm>
-          <a:prstGeom prst="line">
-            <a:avLst/>
-          </a:prstGeom>
-          <a:ln>
-            <a:solidFill>
-              <a:schemeClr val="tx1"/>
-            </a:solidFill>
-          </a:ln>
-        </p:spPr>
-        <p:style>
-          <a:lnRef idx="2">
-            <a:schemeClr val="accent2"/>
-          </a:lnRef>
-          <a:fillRef idx="0">
-            <a:schemeClr val="accent2"/>
-          </a:fillRef>
-          <a:effectRef idx="1">
-            <a:schemeClr val="accent2"/>
-          </a:effectRef>
-          <a:fontRef idx="minor">
-            <a:schemeClr val="tx1"/>
-          </a:fontRef>
-        </p:style>
-      </p:cxnSp>
-      <p:cxnSp>
-        <p:nvCxnSpPr>
-          <p:cNvPr id="37" name="Connecteur droit 36"/>
-          <p:cNvCxnSpPr/>
-          <p:nvPr/>
-        </p:nvCxnSpPr>
-        <p:spPr>
-          <a:xfrm>
-            <a:off x="5897880" y="601980"/>
-            <a:ext cx="0" cy="3848100"/>
-          </a:xfrm>
-          <a:prstGeom prst="line">
-            <a:avLst/>
-          </a:prstGeom>
-          <a:ln>
-            <a:solidFill>
-              <a:schemeClr val="tx1"/>
-            </a:solidFill>
-          </a:ln>
-        </p:spPr>
-        <p:style>
-          <a:lnRef idx="2">
-            <a:schemeClr val="accent2"/>
-          </a:lnRef>
-          <a:fillRef idx="0">
-            <a:schemeClr val="accent2"/>
-          </a:fillRef>
-          <a:effectRef idx="1">
-            <a:schemeClr val="accent2"/>
-          </a:effectRef>
-          <a:fontRef idx="minor">
-            <a:schemeClr val="tx1"/>
-          </a:fontRef>
-        </p:style>
-      </p:cxnSp>
     </p:spTree>
+    <p:extLst>
+      <p:ext uri="{BB962C8B-B14F-4D97-AF65-F5344CB8AC3E}">
+        <p14:creationId xmlns:p14="http://schemas.microsoft.com/office/powerpoint/2010/main" val="3496218721"/>
+      </p:ext>
+    </p:extLst>
   </p:cSld>
   <p:clrMapOvr>
     <a:masterClrMapping/>
@@ -18425,7 +18556,7 @@
             </a:pPr>
             <a:r>
               <a:rPr lang="fr-FR" dirty="0"/>
-              <a:t>Diagramme de déploiement</a:t>
+              <a:t>Diagramme d’exigence</a:t>
             </a:r>
             <a:endParaRPr dirty="0"/>
           </a:p>
@@ -18503,7 +18634,7 @@
     </p:spTree>
     <p:extLst>
       <p:ext uri="{BB962C8B-B14F-4D97-AF65-F5344CB8AC3E}">
-        <p14:creationId xmlns:p14="http://schemas.microsoft.com/office/powerpoint/2010/main" val="543729968"/>
+        <p14:creationId xmlns:p14="http://schemas.microsoft.com/office/powerpoint/2010/main" val="3670339790"/>
       </p:ext>
     </p:extLst>
   </p:cSld>
@@ -18523,9 +18654,17 @@
 <file path=ppt/slides/slide15.xml><?xml version="1.0" encoding="utf-8"?>
 <p:sld xmlns:a="http://schemas.openxmlformats.org/drawingml/2006/main" xmlns:r="http://schemas.openxmlformats.org/officeDocument/2006/relationships" xmlns:p="http://schemas.openxmlformats.org/presentationml/2006/main">
   <p:cSld>
+    <p:bg>
+      <p:bgPr>
+        <a:solidFill>
+          <a:schemeClr val="lt1"/>
+        </a:solidFill>
+        <a:effectLst/>
+      </p:bgPr>
+    </p:bg>
     <p:spTree>
       <p:nvGrpSpPr>
-        <p:cNvPr id="1" name="Shape 282"/>
+        <p:cNvPr id="1" name="Shape 259"/>
         <p:cNvGrpSpPr/>
         <p:nvPr/>
       </p:nvGrpSpPr>
@@ -18537,62 +18676,176 @@
           <a:chExt cx="0" cy="0"/>
         </a:xfrm>
       </p:grpSpPr>
+      <p:sp>
+        <p:nvSpPr>
+          <p:cNvPr id="260" name="Google Shape;260;p37"/>
+          <p:cNvSpPr txBox="1">
+            <a:spLocks noGrp="1"/>
+          </p:cNvSpPr>
+          <p:nvPr>
+            <p:ph type="title"/>
+          </p:nvPr>
+        </p:nvSpPr>
+        <p:spPr>
+          <a:xfrm>
+            <a:off x="613320" y="475505"/>
+            <a:ext cx="2312760" cy="572700"/>
+          </a:xfrm>
+          <a:prstGeom prst="rect">
+            <a:avLst/>
+          </a:prstGeom>
+        </p:spPr>
+        <p:txBody>
+          <a:bodyPr spcFirstLastPara="1" wrap="square" lIns="91425" tIns="91425" rIns="91425" bIns="91425" anchor="t" anchorCtr="0">
+            <a:noAutofit/>
+          </a:bodyPr>
+          <a:lstStyle/>
+          <a:p>
+            <a:pPr marL="0" lvl="0" indent="0" algn="ctr" rtl="0">
+              <a:spcBef>
+                <a:spcPts val="0"/>
+              </a:spcBef>
+              <a:spcAft>
+                <a:spcPts val="0"/>
+              </a:spcAft>
+              <a:buNone/>
+            </a:pPr>
+            <a:r>
+              <a:rPr lang="en" dirty="0"/>
+              <a:t>Diagramme d’exigence</a:t>
+            </a:r>
+            <a:endParaRPr dirty="0"/>
+          </a:p>
+        </p:txBody>
+      </p:sp>
       <p:pic>
         <p:nvPicPr>
-          <p:cNvPr id="289" name="Google Shape;289;p38"/>
-          <p:cNvPicPr preferRelativeResize="0">
-            <a:picLocks noGrp="1"/>
-          </p:cNvPicPr>
-          <p:nvPr>
-            <p:ph type="pic" idx="6"/>
-          </p:nvPr>
-        </p:nvPicPr>
-        <p:blipFill rotWithShape="1">
-          <a:blip r:embed="rId3">
-            <a:alphaModFix/>
-          </a:blip>
-          <a:srcRect l="1475" r="1475"/>
-          <a:stretch/>
-        </p:blipFill>
-        <p:spPr>
-          <a:xfrm>
-            <a:off x="5715000" y="-2250"/>
-            <a:ext cx="3429002" cy="5148000"/>
-          </a:xfrm>
-          <a:prstGeom prst="rect">
-            <a:avLst/>
-          </a:prstGeom>
-        </p:spPr>
-      </p:pic>
-      <p:pic>
-        <p:nvPicPr>
-          <p:cNvPr id="8" name="Image 7"/>
+          <p:cNvPr id="14" name="Image 13"/>
           <p:cNvPicPr>
             <a:picLocks noChangeAspect="1"/>
           </p:cNvPicPr>
           <p:nvPr/>
         </p:nvPicPr>
         <p:blipFill rotWithShape="1">
-          <a:blip r:embed="rId4">
+          <a:blip r:embed="rId3">
             <a:extLst>
               <a:ext uri="{28A0092B-C50C-407E-A947-70E740481C1C}">
                 <a14:useLocalDpi xmlns:a14="http://schemas.microsoft.com/office/drawing/2010/main" val="0"/>
               </a:ext>
             </a:extLst>
           </a:blip>
-          <a:srcRect l="1070" t="1199" r="740" b="1478"/>
+          <a:srcRect r="76629" b="66351"/>
           <a:stretch/>
         </p:blipFill>
         <p:spPr>
           <a:xfrm>
-            <a:off x="437606" y="352698"/>
-            <a:ext cx="4918165" cy="4415246"/>
+            <a:off x="3195683" y="695546"/>
+            <a:ext cx="2361397" cy="3754534"/>
           </a:xfrm>
           <a:prstGeom prst="rect">
             <a:avLst/>
           </a:prstGeom>
         </p:spPr>
       </p:pic>
+      <p:pic>
+        <p:nvPicPr>
+          <p:cNvPr id="15" name="Image 14"/>
+          <p:cNvPicPr>
+            <a:picLocks noChangeAspect="1"/>
+          </p:cNvPicPr>
+          <p:nvPr/>
+        </p:nvPicPr>
+        <p:blipFill rotWithShape="1">
+          <a:blip r:embed="rId3">
+            <a:extLst>
+              <a:ext uri="{28A0092B-C50C-407E-A947-70E740481C1C}">
+                <a14:useLocalDpi xmlns:a14="http://schemas.microsoft.com/office/drawing/2010/main" val="0"/>
+              </a:ext>
+            </a:extLst>
+          </a:blip>
+          <a:srcRect t="34250" r="75923" b="34826"/>
+          <a:stretch/>
+        </p:blipFill>
+        <p:spPr>
+          <a:xfrm>
+            <a:off x="6159864" y="1276667"/>
+            <a:ext cx="2237376" cy="3173413"/>
+          </a:xfrm>
+          <a:prstGeom prst="rect">
+            <a:avLst/>
+          </a:prstGeom>
+        </p:spPr>
+      </p:pic>
+      <p:cxnSp>
+        <p:nvCxnSpPr>
+          <p:cNvPr id="17" name="Connecteur droit 16"/>
+          <p:cNvCxnSpPr/>
+          <p:nvPr/>
+        </p:nvCxnSpPr>
+        <p:spPr>
+          <a:xfrm>
+            <a:off x="5699760" y="601980"/>
+            <a:ext cx="0" cy="3848100"/>
+          </a:xfrm>
+          <a:prstGeom prst="line">
+            <a:avLst/>
+          </a:prstGeom>
+          <a:ln>
+            <a:solidFill>
+              <a:schemeClr val="tx1"/>
+            </a:solidFill>
+          </a:ln>
+        </p:spPr>
+        <p:style>
+          <a:lnRef idx="2">
+            <a:schemeClr val="accent2"/>
+          </a:lnRef>
+          <a:fillRef idx="0">
+            <a:schemeClr val="accent2"/>
+          </a:fillRef>
+          <a:effectRef idx="1">
+            <a:schemeClr val="accent2"/>
+          </a:effectRef>
+          <a:fontRef idx="minor">
+            <a:schemeClr val="tx1"/>
+          </a:fontRef>
+        </p:style>
+      </p:cxnSp>
+      <p:cxnSp>
+        <p:nvCxnSpPr>
+          <p:cNvPr id="37" name="Connecteur droit 36"/>
+          <p:cNvCxnSpPr/>
+          <p:nvPr/>
+        </p:nvCxnSpPr>
+        <p:spPr>
+          <a:xfrm>
+            <a:off x="5897880" y="601980"/>
+            <a:ext cx="0" cy="3848100"/>
+          </a:xfrm>
+          <a:prstGeom prst="line">
+            <a:avLst/>
+          </a:prstGeom>
+          <a:ln>
+            <a:solidFill>
+              <a:schemeClr val="tx1"/>
+            </a:solidFill>
+          </a:ln>
+        </p:spPr>
+        <p:style>
+          <a:lnRef idx="2">
+            <a:schemeClr val="accent2"/>
+          </a:lnRef>
+          <a:fillRef idx="0">
+            <a:schemeClr val="accent2"/>
+          </a:fillRef>
+          <a:effectRef idx="1">
+            <a:schemeClr val="accent2"/>
+          </a:effectRef>
+          <a:fontRef idx="minor">
+            <a:schemeClr val="tx1"/>
+          </a:fontRef>
+        </p:style>
+      </p:cxnSp>
     </p:spTree>
   </p:cSld>
   <p:clrMapOvr>
@@ -18660,10 +18913,10 @@
               <a:buNone/>
             </a:pPr>
             <a:r>
-              <a:rPr lang="fr-FR" sz="3600" dirty="0"/>
-              <a:t>Modèle Conceptuel de Données </a:t>
+              <a:rPr lang="fr-FR" dirty="0"/>
+              <a:t>Diagramme de déploiement</a:t>
             </a:r>
-            <a:endParaRPr sz="3600" dirty="0"/>
+            <a:endParaRPr dirty="0"/>
           </a:p>
         </p:txBody>
       </p:sp>
@@ -18702,7 +18955,7 @@
               <a:buNone/>
             </a:pPr>
             <a:r>
-              <a:rPr lang="en" dirty="0"/>
+              <a:rPr lang="en" dirty="0" smtClean="0"/>
               <a:t>07</a:t>
             </a:r>
             <a:endParaRPr dirty="0"/>
@@ -18739,7 +18992,7 @@
     </p:spTree>
     <p:extLst>
       <p:ext uri="{BB962C8B-B14F-4D97-AF65-F5344CB8AC3E}">
-        <p14:creationId xmlns:p14="http://schemas.microsoft.com/office/powerpoint/2010/main" val="3177932371"/>
+        <p14:creationId xmlns:p14="http://schemas.microsoft.com/office/powerpoint/2010/main" val="543729968"/>
       </p:ext>
     </p:extLst>
   </p:cSld>
@@ -18761,7 +19014,7 @@
   <p:cSld>
     <p:spTree>
       <p:nvGrpSpPr>
-        <p:cNvPr id="1" name="Shape 313"/>
+        <p:cNvPr id="1" name="Shape 282"/>
         <p:cNvGrpSpPr/>
         <p:nvPr/>
       </p:nvGrpSpPr>
@@ -18773,72 +19026,56 @@
           <a:chExt cx="0" cy="0"/>
         </a:xfrm>
       </p:grpSpPr>
-      <p:sp>
-        <p:nvSpPr>
-          <p:cNvPr id="314" name="Google Shape;314;p41"/>
-          <p:cNvSpPr txBox="1">
-            <a:spLocks noGrp="1"/>
-          </p:cNvSpPr>
-          <p:nvPr>
-            <p:ph type="title"/>
-          </p:nvPr>
-        </p:nvSpPr>
-        <p:spPr>
-          <a:xfrm>
-            <a:off x="720000" y="597425"/>
-            <a:ext cx="7704000" cy="572700"/>
-          </a:xfrm>
-          <a:prstGeom prst="rect">
-            <a:avLst/>
-          </a:prstGeom>
-        </p:spPr>
-        <p:txBody>
-          <a:bodyPr spcFirstLastPara="1" wrap="square" lIns="91425" tIns="91425" rIns="91425" bIns="91425" anchor="t" anchorCtr="0">
-            <a:noAutofit/>
-          </a:bodyPr>
-          <a:lstStyle/>
-          <a:p>
-            <a:pPr marL="0" lvl="0" indent="0" algn="ctr" rtl="0">
-              <a:spcBef>
-                <a:spcPts val="0"/>
-              </a:spcBef>
-              <a:spcAft>
-                <a:spcPts val="0"/>
-              </a:spcAft>
-              <a:buNone/>
-            </a:pPr>
-            <a:r>
-              <a:rPr lang="en" dirty="0"/>
-              <a:t>Modèle Conceptuel de Données</a:t>
-            </a:r>
-            <a:endParaRPr dirty="0"/>
-          </a:p>
-        </p:txBody>
-      </p:sp>
       <p:pic>
         <p:nvPicPr>
-          <p:cNvPr id="3" name="Image 2"/>
+          <p:cNvPr id="289" name="Google Shape;289;p38"/>
+          <p:cNvPicPr preferRelativeResize="0">
+            <a:picLocks noGrp="1"/>
+          </p:cNvPicPr>
+          <p:nvPr>
+            <p:ph type="pic" idx="6"/>
+          </p:nvPr>
+        </p:nvPicPr>
+        <p:blipFill rotWithShape="1">
+          <a:blip r:embed="rId3">
+            <a:alphaModFix/>
+          </a:blip>
+          <a:srcRect l="1475" r="1475"/>
+          <a:stretch/>
+        </p:blipFill>
+        <p:spPr>
+          <a:xfrm>
+            <a:off x="5715000" y="-2250"/>
+            <a:ext cx="3429002" cy="5148000"/>
+          </a:xfrm>
+          <a:prstGeom prst="rect">
+            <a:avLst/>
+          </a:prstGeom>
+        </p:spPr>
+      </p:pic>
+      <p:pic>
+        <p:nvPicPr>
+          <p:cNvPr id="8" name="Image 7"/>
           <p:cNvPicPr>
             <a:picLocks noChangeAspect="1"/>
           </p:cNvPicPr>
           <p:nvPr/>
         </p:nvPicPr>
-        <p:blipFill>
-          <a:blip r:embed="rId3">
+        <p:blipFill rotWithShape="1">
+          <a:blip r:embed="rId4">
             <a:extLst>
               <a:ext uri="{28A0092B-C50C-407E-A947-70E740481C1C}">
                 <a14:useLocalDpi xmlns:a14="http://schemas.microsoft.com/office/drawing/2010/main" val="0"/>
               </a:ext>
             </a:extLst>
           </a:blip>
-          <a:stretch>
-            <a:fillRect/>
-          </a:stretch>
+          <a:srcRect l="1070" t="1199" r="740" b="1478"/>
+          <a:stretch/>
         </p:blipFill>
         <p:spPr>
           <a:xfrm>
-            <a:off x="1363765" y="1548472"/>
-            <a:ext cx="6416469" cy="2863171"/>
+            <a:off x="437606" y="352698"/>
+            <a:ext cx="4918165" cy="4415246"/>
           </a:xfrm>
           <a:prstGeom prst="rect">
             <a:avLst/>
@@ -18912,10 +19149,10 @@
               <a:buNone/>
             </a:pPr>
             <a:r>
-              <a:rPr lang="fr-FR" dirty="0"/>
-              <a:t>CRA</a:t>
+              <a:rPr lang="fr-FR" sz="3600" dirty="0"/>
+              <a:t>Modèle Conceptuel de Données </a:t>
             </a:r>
-            <a:endParaRPr dirty="0"/>
+            <a:endParaRPr sz="3600" dirty="0"/>
           </a:p>
         </p:txBody>
       </p:sp>
@@ -18954,7 +19191,7 @@
               <a:buNone/>
             </a:pPr>
             <a:r>
-              <a:rPr lang="en" dirty="0"/>
+              <a:rPr lang="en" dirty="0" smtClean="0"/>
               <a:t>08</a:t>
             </a:r>
             <a:endParaRPr dirty="0"/>
@@ -18991,7 +19228,7 @@
     </p:spTree>
     <p:extLst>
       <p:ext uri="{BB962C8B-B14F-4D97-AF65-F5344CB8AC3E}">
-        <p14:creationId xmlns:p14="http://schemas.microsoft.com/office/powerpoint/2010/main" val="2372851940"/>
+        <p14:creationId xmlns:p14="http://schemas.microsoft.com/office/powerpoint/2010/main" val="3177932371"/>
       </p:ext>
     </p:extLst>
   </p:cSld>
@@ -19013,7 +19250,7 @@
   <p:cSld>
     <p:spTree>
       <p:nvGrpSpPr>
-        <p:cNvPr id="1" name="Shape 319"/>
+        <p:cNvPr id="1" name="Shape 313"/>
         <p:cNvGrpSpPr/>
         <p:nvPr/>
       </p:nvGrpSpPr>
@@ -19027,8 +19264,8 @@
       </p:grpSpPr>
       <p:sp>
         <p:nvSpPr>
-          <p:cNvPr id="4" name="Titre 3"/>
-          <p:cNvSpPr>
+          <p:cNvPr id="314" name="Google Shape;314;p41"/>
+          <p:cNvSpPr txBox="1">
             <a:spLocks noGrp="1"/>
           </p:cNvSpPr>
           <p:nvPr>
@@ -19037,24 +19274,66 @@
         </p:nvSpPr>
         <p:spPr>
           <a:xfrm>
-            <a:off x="2811952" y="1685108"/>
-            <a:ext cx="3288402" cy="1351855"/>
-          </a:xfrm>
+            <a:off x="720000" y="597425"/>
+            <a:ext cx="7704000" cy="572700"/>
+          </a:xfrm>
+          <a:prstGeom prst="rect">
+            <a:avLst/>
+          </a:prstGeom>
         </p:spPr>
         <p:txBody>
-          <a:bodyPr/>
+          <a:bodyPr spcFirstLastPara="1" wrap="square" lIns="91425" tIns="91425" rIns="91425" bIns="91425" anchor="t" anchorCtr="0">
+            <a:noAutofit/>
+          </a:bodyPr>
           <a:lstStyle/>
           <a:p>
+            <a:pPr marL="0" lvl="0" indent="0" algn="ctr" rtl="0">
+              <a:spcBef>
+                <a:spcPts val="0"/>
+              </a:spcBef>
+              <a:spcAft>
+                <a:spcPts val="0"/>
+              </a:spcAft>
+              <a:buNone/>
+            </a:pPr>
             <a:r>
-              <a:rPr lang="fr-FR" sz="1200" dirty="0">
-                <a:hlinkClick r:id="rId3"/>
-              </a:rPr>
-              <a:t>CRA projet DMX</a:t>
+              <a:rPr lang="en" dirty="0"/>
+              <a:t>Modèle Conceptuel de Données</a:t>
             </a:r>
-            <a:endParaRPr lang="fr-FR" sz="1200" dirty="0"/>
+            <a:endParaRPr dirty="0"/>
           </a:p>
         </p:txBody>
       </p:sp>
+      <p:pic>
+        <p:nvPicPr>
+          <p:cNvPr id="3" name="Image 2"/>
+          <p:cNvPicPr>
+            <a:picLocks noChangeAspect="1"/>
+          </p:cNvPicPr>
+          <p:nvPr/>
+        </p:nvPicPr>
+        <p:blipFill>
+          <a:blip r:embed="rId3">
+            <a:extLst>
+              <a:ext uri="{28A0092B-C50C-407E-A947-70E740481C1C}">
+                <a14:useLocalDpi xmlns:a14="http://schemas.microsoft.com/office/drawing/2010/main" val="0"/>
+              </a:ext>
+            </a:extLst>
+          </a:blip>
+          <a:stretch>
+            <a:fillRect/>
+          </a:stretch>
+        </p:blipFill>
+        <p:spPr>
+          <a:xfrm>
+            <a:off x="1363765" y="1548472"/>
+            <a:ext cx="6416469" cy="2863171"/>
+          </a:xfrm>
+          <a:prstGeom prst="rect">
+            <a:avLst/>
+          </a:prstGeom>
+        </p:spPr>
+      </p:pic>
     </p:spTree>
   </p:cSld>
   <p:clrMapOvr>
@@ -19296,7 +19575,6 @@
               <a:rPr lang="fr-FR" sz="1400" dirty="0"/>
               <a:t>Diagramme synoptique</a:t>
             </a:r>
-            <a:endParaRPr lang="fr-FR" sz="1400" dirty="0"/>
           </a:p>
         </p:txBody>
       </p:sp>
@@ -19438,7 +19716,7 @@
         </p:nvSpPr>
         <p:spPr>
           <a:xfrm>
-            <a:off x="940181" y="2776392"/>
+            <a:off x="2817607" y="2765147"/>
             <a:ext cx="1759246" cy="553692"/>
           </a:xfrm>
           <a:prstGeom prst="rect">
@@ -19480,7 +19758,7 @@
         </p:nvSpPr>
         <p:spPr>
           <a:xfrm>
-            <a:off x="1393364" y="2324199"/>
+            <a:off x="3270790" y="2312954"/>
             <a:ext cx="734700" cy="447600"/>
           </a:xfrm>
           <a:prstGeom prst="rect">
@@ -19503,8 +19781,8 @@
               <a:buNone/>
             </a:pPr>
             <a:r>
-              <a:rPr lang="en" sz="2400" dirty="0"/>
-              <a:t>05</a:t>
+              <a:rPr lang="en" sz="2400" dirty="0" smtClean="0"/>
+              <a:t>06</a:t>
             </a:r>
             <a:endParaRPr sz="2400" dirty="0"/>
           </a:p>
@@ -19522,7 +19800,7 @@
         </p:nvSpPr>
         <p:spPr>
           <a:xfrm>
-            <a:off x="3270790" y="2312601"/>
+            <a:off x="5148216" y="2301356"/>
             <a:ext cx="734700" cy="447600"/>
           </a:xfrm>
           <a:prstGeom prst="rect">
@@ -19545,8 +19823,8 @@
               <a:buNone/>
             </a:pPr>
             <a:r>
-              <a:rPr lang="en" sz="2400" dirty="0"/>
-              <a:t>06</a:t>
+              <a:rPr lang="en" sz="2400" dirty="0" smtClean="0"/>
+              <a:t>07</a:t>
             </a:r>
             <a:endParaRPr sz="2400" dirty="0"/>
           </a:p>
@@ -19564,7 +19842,7 @@
         </p:nvSpPr>
         <p:spPr>
           <a:xfrm>
-            <a:off x="2734533" y="2746563"/>
+            <a:off x="4611959" y="2735318"/>
             <a:ext cx="1877426" cy="596127"/>
           </a:xfrm>
           <a:prstGeom prst="rect">
@@ -19639,7 +19917,7 @@
         </p:nvSpPr>
         <p:spPr>
           <a:xfrm>
-            <a:off x="5153777" y="2311329"/>
+            <a:off x="7031203" y="2300084"/>
             <a:ext cx="734700" cy="447600"/>
           </a:xfrm>
           <a:prstGeom prst="rect">
@@ -19662,8 +19940,8 @@
               <a:buNone/>
             </a:pPr>
             <a:r>
-              <a:rPr lang="en" sz="2400" dirty="0"/>
-              <a:t>07</a:t>
+              <a:rPr lang="en" sz="2400" dirty="0" smtClean="0"/>
+              <a:t>08</a:t>
             </a:r>
             <a:endParaRPr sz="2400" dirty="0"/>
           </a:p>
@@ -19681,7 +19959,7 @@
         </p:nvSpPr>
         <p:spPr>
           <a:xfrm>
-            <a:off x="7041162" y="2322927"/>
+            <a:off x="1363841" y="2339971"/>
             <a:ext cx="734700" cy="447600"/>
           </a:xfrm>
           <a:prstGeom prst="rect">
@@ -19704,8 +19982,8 @@
               <a:buNone/>
             </a:pPr>
             <a:r>
-              <a:rPr lang="en" sz="2400" dirty="0"/>
-              <a:t>08</a:t>
+              <a:rPr lang="en" sz="2400" dirty="0" smtClean="0"/>
+              <a:t>05</a:t>
             </a:r>
             <a:endParaRPr sz="2400" dirty="0"/>
           </a:p>
@@ -19723,7 +20001,7 @@
         </p:nvSpPr>
         <p:spPr>
           <a:xfrm>
-            <a:off x="4641504" y="2776927"/>
+            <a:off x="6518930" y="2765682"/>
             <a:ext cx="1759246" cy="553692"/>
           </a:xfrm>
           <a:prstGeom prst="rect">
@@ -19765,7 +20043,7 @@
         </p:nvSpPr>
         <p:spPr>
           <a:xfrm>
-            <a:off x="6524491" y="2746563"/>
+            <a:off x="847170" y="2763607"/>
             <a:ext cx="1759246" cy="553692"/>
           </a:xfrm>
           <a:prstGeom prst="rect">
@@ -19788,8 +20066,8 @@
               <a:buNone/>
             </a:pPr>
             <a:r>
-              <a:rPr lang="fr-FR" sz="1400" dirty="0"/>
-              <a:t>CRA</a:t>
+              <a:rPr lang="fr-FR" sz="1400" dirty="0" smtClean="0"/>
+              <a:t>Diagramme de séquence</a:t>
             </a:r>
             <a:endParaRPr sz="1400" dirty="0"/>
           </a:p>
@@ -19864,8 +20142,8 @@
           <a:p>
             <a:pPr marL="0" lvl="0" indent="0"/>
             <a:r>
-              <a:rPr lang="fr-FR" sz="1400" dirty="0"/>
-              <a:t>GANTT</a:t>
+              <a:rPr lang="fr-FR" sz="1400" dirty="0" smtClean="0"/>
+              <a:t>CRA</a:t>
             </a:r>
             <a:endParaRPr sz="1400" dirty="0"/>
           </a:p>
@@ -19926,6 +20204,82 @@
         <p:spPr>
           <a:xfrm>
             <a:off x="2694574" y="3898959"/>
+            <a:ext cx="1877426" cy="596127"/>
+          </a:xfrm>
+          <a:prstGeom prst="rect">
+            <a:avLst/>
+          </a:prstGeom>
+        </p:spPr>
+        <p:txBody>
+          <a:bodyPr spcFirstLastPara="1" wrap="square" lIns="91425" tIns="91425" rIns="91425" bIns="91425" anchor="t" anchorCtr="0">
+            <a:noAutofit/>
+          </a:bodyPr>
+          <a:lstStyle/>
+          <a:p>
+            <a:pPr marL="0" lvl="0" indent="0"/>
+            <a:r>
+              <a:rPr lang="fr-FR" sz="1400" dirty="0" smtClean="0"/>
+              <a:t>GANTT</a:t>
+            </a:r>
+            <a:endParaRPr sz="1400" dirty="0"/>
+          </a:p>
+        </p:txBody>
+      </p:sp>
+      <p:sp>
+        <p:nvSpPr>
+          <p:cNvPr id="29" name="Google Shape;188;p31"/>
+          <p:cNvSpPr txBox="1">
+            <a:spLocks noGrp="1"/>
+          </p:cNvSpPr>
+          <p:nvPr>
+            <p:ph type="title" idx="2"/>
+          </p:nvPr>
+        </p:nvSpPr>
+        <p:spPr>
+          <a:xfrm>
+            <a:off x="5168072" y="3509105"/>
+            <a:ext cx="734700" cy="447600"/>
+          </a:xfrm>
+          <a:prstGeom prst="rect">
+            <a:avLst/>
+          </a:prstGeom>
+        </p:spPr>
+        <p:txBody>
+          <a:bodyPr spcFirstLastPara="1" wrap="square" lIns="91425" tIns="91425" rIns="91425" bIns="91425" anchor="ctr" anchorCtr="0">
+            <a:noAutofit/>
+          </a:bodyPr>
+          <a:lstStyle/>
+          <a:p>
+            <a:pPr marL="0" lvl="0" indent="0" algn="ctr" rtl="0">
+              <a:spcBef>
+                <a:spcPts val="0"/>
+              </a:spcBef>
+              <a:spcAft>
+                <a:spcPts val="0"/>
+              </a:spcAft>
+              <a:buNone/>
+            </a:pPr>
+            <a:r>
+              <a:rPr lang="en" sz="2400" dirty="0" smtClean="0"/>
+              <a:t>11</a:t>
+            </a:r>
+            <a:endParaRPr sz="2400" dirty="0"/>
+          </a:p>
+        </p:txBody>
+      </p:sp>
+      <p:sp>
+        <p:nvSpPr>
+          <p:cNvPr id="30" name="Google Shape;194;p31"/>
+          <p:cNvSpPr txBox="1">
+            <a:spLocks noGrp="1"/>
+          </p:cNvSpPr>
+          <p:nvPr>
+            <p:ph type="subTitle" idx="1"/>
+          </p:nvPr>
+        </p:nvSpPr>
+        <p:spPr>
+          <a:xfrm>
+            <a:off x="4586506" y="3897646"/>
             <a:ext cx="1877426" cy="596127"/>
           </a:xfrm>
           <a:prstGeom prst="rect">
@@ -20015,7 +20369,7 @@
             </a:pPr>
             <a:r>
               <a:rPr lang="fr-FR" dirty="0"/>
-              <a:t>GANTT</a:t>
+              <a:t>CRA</a:t>
             </a:r>
             <a:endParaRPr dirty="0"/>
           </a:p>
@@ -20056,7 +20410,7 @@
               <a:buNone/>
             </a:pPr>
             <a:r>
-              <a:rPr lang="en" dirty="0"/>
+              <a:rPr lang="en" dirty="0" smtClean="0"/>
               <a:t>09</a:t>
             </a:r>
             <a:endParaRPr dirty="0"/>
@@ -20093,6 +20447,216 @@
     </p:spTree>
     <p:extLst>
       <p:ext uri="{BB962C8B-B14F-4D97-AF65-F5344CB8AC3E}">
+        <p14:creationId xmlns:p14="http://schemas.microsoft.com/office/powerpoint/2010/main" val="2372851940"/>
+      </p:ext>
+    </p:extLst>
+  </p:cSld>
+  <p:clrMapOvr>
+    <a:masterClrMapping/>
+  </p:clrMapOvr>
+  <p:timing>
+    <p:tnLst>
+      <p:par>
+        <p:cTn id="1" dur="indefinite" restart="never" nodeType="tmRoot"/>
+      </p:par>
+    </p:tnLst>
+  </p:timing>
+</p:sld>
+</file>
+
+<file path=ppt/slides/slide21.xml><?xml version="1.0" encoding="utf-8"?>
+<p:sld xmlns:a="http://schemas.openxmlformats.org/drawingml/2006/main" xmlns:r="http://schemas.openxmlformats.org/officeDocument/2006/relationships" xmlns:p="http://schemas.openxmlformats.org/presentationml/2006/main">
+  <p:cSld>
+    <p:spTree>
+      <p:nvGrpSpPr>
+        <p:cNvPr id="1" name="Shape 319"/>
+        <p:cNvGrpSpPr/>
+        <p:nvPr/>
+      </p:nvGrpSpPr>
+      <p:grpSpPr>
+        <a:xfrm>
+          <a:off x="0" y="0"/>
+          <a:ext cx="0" cy="0"/>
+          <a:chOff x="0" y="0"/>
+          <a:chExt cx="0" cy="0"/>
+        </a:xfrm>
+      </p:grpSpPr>
+      <p:sp>
+        <p:nvSpPr>
+          <p:cNvPr id="4" name="Titre 3"/>
+          <p:cNvSpPr>
+            <a:spLocks noGrp="1"/>
+          </p:cNvSpPr>
+          <p:nvPr>
+            <p:ph type="title"/>
+          </p:nvPr>
+        </p:nvSpPr>
+        <p:spPr>
+          <a:xfrm>
+            <a:off x="2811952" y="1685108"/>
+            <a:ext cx="3288402" cy="1351855"/>
+          </a:xfrm>
+        </p:spPr>
+        <p:txBody>
+          <a:bodyPr/>
+          <a:lstStyle/>
+          <a:p>
+            <a:r>
+              <a:rPr lang="fr-FR" sz="1200" dirty="0">
+                <a:hlinkClick r:id="rId3"/>
+              </a:rPr>
+              <a:t>CRA projet DMX</a:t>
+            </a:r>
+            <a:endParaRPr lang="fr-FR" sz="1200" dirty="0"/>
+          </a:p>
+        </p:txBody>
+      </p:sp>
+    </p:spTree>
+  </p:cSld>
+  <p:clrMapOvr>
+    <a:masterClrMapping/>
+  </p:clrMapOvr>
+  <p:timing>
+    <p:tnLst>
+      <p:par>
+        <p:cTn id="1" dur="indefinite" restart="never" nodeType="tmRoot"/>
+      </p:par>
+    </p:tnLst>
+  </p:timing>
+</p:sld>
+</file>
+
+<file path=ppt/slides/slide22.xml><?xml version="1.0" encoding="utf-8"?>
+<p:sld xmlns:a="http://schemas.openxmlformats.org/drawingml/2006/main" xmlns:r="http://schemas.openxmlformats.org/officeDocument/2006/relationships" xmlns:p="http://schemas.openxmlformats.org/presentationml/2006/main">
+  <p:cSld>
+    <p:spTree>
+      <p:nvGrpSpPr>
+        <p:cNvPr id="1" name="Shape 210"/>
+        <p:cNvGrpSpPr/>
+        <p:nvPr/>
+      </p:nvGrpSpPr>
+      <p:grpSpPr>
+        <a:xfrm>
+          <a:off x="0" y="0"/>
+          <a:ext cx="0" cy="0"/>
+          <a:chOff x="0" y="0"/>
+          <a:chExt cx="0" cy="0"/>
+        </a:xfrm>
+      </p:grpSpPr>
+      <p:sp>
+        <p:nvSpPr>
+          <p:cNvPr id="211" name="Google Shape;211;p33"/>
+          <p:cNvSpPr txBox="1">
+            <a:spLocks noGrp="1"/>
+          </p:cNvSpPr>
+          <p:nvPr>
+            <p:ph type="title"/>
+          </p:nvPr>
+        </p:nvSpPr>
+        <p:spPr>
+          <a:xfrm>
+            <a:off x="3403454" y="783554"/>
+            <a:ext cx="4383600" cy="1626600"/>
+          </a:xfrm>
+          <a:prstGeom prst="rect">
+            <a:avLst/>
+          </a:prstGeom>
+        </p:spPr>
+        <p:txBody>
+          <a:bodyPr spcFirstLastPara="1" wrap="square" lIns="91425" tIns="91425" rIns="91425" bIns="91425" anchor="ctr" anchorCtr="0">
+            <a:noAutofit/>
+          </a:bodyPr>
+          <a:lstStyle/>
+          <a:p>
+            <a:pPr marL="0" lvl="0" indent="0" algn="l" rtl="0">
+              <a:spcBef>
+                <a:spcPts val="0"/>
+              </a:spcBef>
+              <a:spcAft>
+                <a:spcPts val="0"/>
+              </a:spcAft>
+              <a:buNone/>
+            </a:pPr>
+            <a:r>
+              <a:rPr lang="fr-FR" dirty="0"/>
+              <a:t>GANTT</a:t>
+            </a:r>
+            <a:endParaRPr dirty="0"/>
+          </a:p>
+        </p:txBody>
+      </p:sp>
+      <p:sp>
+        <p:nvSpPr>
+          <p:cNvPr id="212" name="Google Shape;212;p33"/>
+          <p:cNvSpPr txBox="1">
+            <a:spLocks noGrp="1"/>
+          </p:cNvSpPr>
+          <p:nvPr>
+            <p:ph type="title" idx="2"/>
+          </p:nvPr>
+        </p:nvSpPr>
+        <p:spPr>
+          <a:xfrm>
+            <a:off x="1356946" y="783550"/>
+            <a:ext cx="2046600" cy="1626600"/>
+          </a:xfrm>
+          <a:prstGeom prst="rect">
+            <a:avLst/>
+          </a:prstGeom>
+        </p:spPr>
+        <p:txBody>
+          <a:bodyPr spcFirstLastPara="1" wrap="square" lIns="91425" tIns="91425" rIns="91425" bIns="91425" anchor="ctr" anchorCtr="0">
+            <a:noAutofit/>
+          </a:bodyPr>
+          <a:lstStyle/>
+          <a:p>
+            <a:pPr marL="0" lvl="0" indent="0" algn="ctr" rtl="0">
+              <a:spcBef>
+                <a:spcPts val="0"/>
+              </a:spcBef>
+              <a:spcAft>
+                <a:spcPts val="0"/>
+              </a:spcAft>
+              <a:buNone/>
+            </a:pPr>
+            <a:r>
+              <a:rPr lang="en" dirty="0" smtClean="0"/>
+              <a:t>10</a:t>
+            </a:r>
+            <a:endParaRPr dirty="0"/>
+          </a:p>
+        </p:txBody>
+      </p:sp>
+      <p:pic>
+        <p:nvPicPr>
+          <p:cNvPr id="213" name="Google Shape;213;p33"/>
+          <p:cNvPicPr preferRelativeResize="0">
+            <a:picLocks noGrp="1"/>
+          </p:cNvPicPr>
+          <p:nvPr>
+            <p:ph type="pic" idx="3"/>
+          </p:nvPr>
+        </p:nvPicPr>
+        <p:blipFill rotWithShape="1">
+          <a:blip r:embed="rId3">
+            <a:alphaModFix/>
+          </a:blip>
+          <a:srcRect t="37146" b="27145"/>
+          <a:stretch/>
+        </p:blipFill>
+        <p:spPr>
+          <a:xfrm>
+            <a:off x="0" y="2967301"/>
+            <a:ext cx="9144003" cy="2176199"/>
+          </a:xfrm>
+          <a:prstGeom prst="rect">
+            <a:avLst/>
+          </a:prstGeom>
+        </p:spPr>
+      </p:pic>
+    </p:spTree>
+    <p:extLst>
+      <p:ext uri="{BB962C8B-B14F-4D97-AF65-F5344CB8AC3E}">
         <p14:creationId xmlns:p14="http://schemas.microsoft.com/office/powerpoint/2010/main" val="194482843"/>
       </p:ext>
     </p:extLst>
@@ -20110,7 +20674,7 @@
 </p:sld>
 </file>
 
-<file path=ppt/slides/slide21.xml><?xml version="1.0" encoding="utf-8"?>
+<file path=ppt/slides/slide23.xml><?xml version="1.0" encoding="utf-8"?>
 <p:sld xmlns:a="http://schemas.openxmlformats.org/drawingml/2006/main" xmlns:r="http://schemas.openxmlformats.org/officeDocument/2006/relationships" xmlns:p="http://schemas.openxmlformats.org/presentationml/2006/main">
   <p:cSld>
     <p:spTree>
@@ -20178,7 +20742,7 @@
 </p:sld>
 </file>
 
-<file path=ppt/slides/slide22.xml><?xml version="1.0" encoding="utf-8"?>
+<file path=ppt/slides/slide24.xml><?xml version="1.0" encoding="utf-8"?>
 <p:sld xmlns:a="http://schemas.openxmlformats.org/drawingml/2006/main" xmlns:r="http://schemas.openxmlformats.org/officeDocument/2006/relationships" xmlns:p="http://schemas.openxmlformats.org/presentationml/2006/main">
   <p:cSld>
     <p:spTree>
@@ -20273,7 +20837,7 @@
             </a:pPr>
             <a:r>
               <a:rPr lang="en" dirty="0" smtClean="0"/>
-              <a:t>10</a:t>
+              <a:t>11</a:t>
             </a:r>
             <a:endParaRPr dirty="0"/>
           </a:p>
@@ -20326,7 +20890,7 @@
 </p:sld>
 </file>
 
-<file path=ppt/slides/slide23.xml><?xml version="1.0" encoding="utf-8"?>
+<file path=ppt/slides/slide25.xml><?xml version="1.0" encoding="utf-8"?>
 <p:sld xmlns:a="http://schemas.openxmlformats.org/drawingml/2006/main" xmlns:r="http://schemas.openxmlformats.org/officeDocument/2006/relationships" xmlns:p="http://schemas.openxmlformats.org/presentationml/2006/main">
   <p:cSld>
     <p:spTree>

</xml_diff>